<commit_message>
add examples on class
</commit_message>
<xml_diff>
--- a/Modulo-4/clase 2/laminas.pptx
+++ b/Modulo-4/clase 2/laminas.pptx
@@ -5,7 +5,7 @@
     <p:sldMasterId id="2147483659" r:id="rId1"/>
   </p:sldMasterIdLst>
   <p:notesMasterIdLst>
-    <p:notesMasterId r:id="rId8"/>
+    <p:notesMasterId r:id="rId9"/>
   </p:notesMasterIdLst>
   <p:sldIdLst>
     <p:sldId id="256" r:id="rId2"/>
@@ -13,22 +13,23 @@
     <p:sldId id="263" r:id="rId4"/>
     <p:sldId id="264" r:id="rId5"/>
     <p:sldId id="265" r:id="rId6"/>
-    <p:sldId id="262" r:id="rId7"/>
+    <p:sldId id="266" r:id="rId7"/>
+    <p:sldId id="262" r:id="rId8"/>
   </p:sldIdLst>
   <p:sldSz cx="9144000" cy="5143500" type="screen16x9"/>
   <p:notesSz cx="6858000" cy="9144000"/>
   <p:embeddedFontLst>
     <p:embeddedFont>
       <p:font typeface="Calibri" panose="020F0502020204030204" pitchFamily="34" charset="0"/>
-      <p:regular r:id="rId9"/>
-      <p:bold r:id="rId10"/>
-      <p:italic r:id="rId11"/>
-      <p:boldItalic r:id="rId12"/>
+      <p:regular r:id="rId10"/>
+      <p:bold r:id="rId11"/>
+      <p:italic r:id="rId12"/>
+      <p:boldItalic r:id="rId13"/>
     </p:embeddedFont>
     <p:embeddedFont>
       <p:font typeface="Space Grotesk Light" pitchFamily="2" charset="77"/>
-      <p:regular r:id="rId13"/>
-      <p:bold r:id="rId14"/>
+      <p:regular r:id="rId14"/>
+      <p:bold r:id="rId15"/>
     </p:embeddedFont>
   </p:embeddedFontLst>
   <p:defaultTextStyle>
@@ -1245,6 +1246,115 @@
 </file>
 
 <file path=ppt/notesSlides/notesSlide6.xml><?xml version="1.0" encoding="utf-8"?>
+<p:notes xmlns:a="http://schemas.openxmlformats.org/drawingml/2006/main" xmlns:r="http://schemas.openxmlformats.org/officeDocument/2006/relationships" xmlns:p="http://schemas.openxmlformats.org/presentationml/2006/main" showMasterSp="0" showMasterPhAnim="0">
+  <p:cSld>
+    <p:spTree>
+      <p:nvGrpSpPr>
+        <p:cNvPr id="1" name="Shape 873"/>
+        <p:cNvGrpSpPr/>
+        <p:nvPr/>
+      </p:nvGrpSpPr>
+      <p:grpSpPr>
+        <a:xfrm>
+          <a:off x="0" y="0"/>
+          <a:ext cx="0" cy="0"/>
+          <a:chOff x="0" y="0"/>
+          <a:chExt cx="0" cy="0"/>
+        </a:xfrm>
+      </p:grpSpPr>
+      <p:sp>
+        <p:nvSpPr>
+          <p:cNvPr id="874" name="Google Shape;874;g35f391192_00:notes"/>
+          <p:cNvSpPr>
+            <a:spLocks noGrp="1" noRot="1" noChangeAspect="1"/>
+          </p:cNvSpPr>
+          <p:nvPr>
+            <p:ph type="sldImg" idx="2"/>
+          </p:nvPr>
+        </p:nvSpPr>
+        <p:spPr>
+          <a:xfrm>
+            <a:off x="381000" y="685800"/>
+            <a:ext cx="6096000" cy="3429000"/>
+          </a:xfrm>
+          <a:custGeom>
+            <a:avLst/>
+            <a:gdLst/>
+            <a:ahLst/>
+            <a:cxnLst/>
+            <a:rect l="l" t="t" r="r" b="b"/>
+            <a:pathLst>
+              <a:path w="120000" h="120000" extrusionOk="0">
+                <a:moveTo>
+                  <a:pt x="0" y="0"/>
+                </a:moveTo>
+                <a:lnTo>
+                  <a:pt x="120000" y="0"/>
+                </a:lnTo>
+                <a:lnTo>
+                  <a:pt x="120000" y="120000"/>
+                </a:lnTo>
+                <a:lnTo>
+                  <a:pt x="0" y="120000"/>
+                </a:lnTo>
+                <a:close/>
+              </a:path>
+            </a:pathLst>
+          </a:custGeom>
+        </p:spPr>
+      </p:sp>
+      <p:sp>
+        <p:nvSpPr>
+          <p:cNvPr id="875" name="Google Shape;875;g35f391192_00:notes"/>
+          <p:cNvSpPr txBox="1">
+            <a:spLocks noGrp="1"/>
+          </p:cNvSpPr>
+          <p:nvPr>
+            <p:ph type="body" idx="1"/>
+          </p:nvPr>
+        </p:nvSpPr>
+        <p:spPr>
+          <a:xfrm>
+            <a:off x="685800" y="4343400"/>
+            <a:ext cx="5486400" cy="4114800"/>
+          </a:xfrm>
+          <a:prstGeom prst="rect">
+            <a:avLst/>
+          </a:prstGeom>
+        </p:spPr>
+        <p:txBody>
+          <a:bodyPr spcFirstLastPara="1" wrap="square" lIns="91425" tIns="91425" rIns="91425" bIns="91425" anchor="t" anchorCtr="0">
+            <a:noAutofit/>
+          </a:bodyPr>
+          <a:lstStyle/>
+          <a:p>
+            <a:pPr marL="0" lvl="0" indent="0" algn="l" rtl="0">
+              <a:spcBef>
+                <a:spcPts val="0"/>
+              </a:spcBef>
+              <a:spcAft>
+                <a:spcPts val="0"/>
+              </a:spcAft>
+              <a:buNone/>
+            </a:pPr>
+            <a:endParaRPr dirty="0"/>
+          </a:p>
+        </p:txBody>
+      </p:sp>
+    </p:spTree>
+    <p:extLst>
+      <p:ext uri="{BB962C8B-B14F-4D97-AF65-F5344CB8AC3E}">
+        <p14:creationId xmlns:p14="http://schemas.microsoft.com/office/powerpoint/2010/main" val="3280420970"/>
+      </p:ext>
+    </p:extLst>
+  </p:cSld>
+  <p:clrMapOvr>
+    <a:masterClrMapping/>
+  </p:clrMapOvr>
+</p:notes>
+</file>
+
+<file path=ppt/notesSlides/notesSlide7.xml><?xml version="1.0" encoding="utf-8"?>
 <p:notes xmlns:a="http://schemas.openxmlformats.org/drawingml/2006/main" xmlns:r="http://schemas.openxmlformats.org/officeDocument/2006/relationships" xmlns:p="http://schemas.openxmlformats.org/presentationml/2006/main" showMasterSp="0" showMasterPhAnim="0">
   <p:cSld>
     <p:spTree>
@@ -19188,6 +19298,231 @@
       </p:grpSpPr>
       <p:sp>
         <p:nvSpPr>
+          <p:cNvPr id="5" name="TextBox 4">
+            <a:extLst>
+              <a:ext uri="{FF2B5EF4-FFF2-40B4-BE49-F238E27FC236}">
+                <a16:creationId xmlns:a16="http://schemas.microsoft.com/office/drawing/2014/main" id="{36B3D953-0CA6-C883-739F-8C10ADD4C6A9}"/>
+              </a:ext>
+            </a:extLst>
+          </p:cNvPr>
+          <p:cNvSpPr txBox="1"/>
+          <p:nvPr/>
+        </p:nvSpPr>
+        <p:spPr>
+          <a:xfrm>
+            <a:off x="985234" y="850006"/>
+            <a:ext cx="4535216" cy="1169551"/>
+          </a:xfrm>
+          <a:prstGeom prst="rect">
+            <a:avLst/>
+          </a:prstGeom>
+          <a:noFill/>
+        </p:spPr>
+        <p:txBody>
+          <a:bodyPr wrap="none" rtlCol="0">
+            <a:spAutoFit/>
+          </a:bodyPr>
+          <a:lstStyle/>
+          <a:p>
+            <a:r>
+              <a:rPr lang="es-ES_tradnl" dirty="0"/>
+              <a:t>POO -&gt; Programación Orientada a Objectos</a:t>
+            </a:r>
+          </a:p>
+          <a:p>
+            <a:endParaRPr lang="es-ES_tradnl" dirty="0"/>
+          </a:p>
+          <a:p>
+            <a:r>
+              <a:rPr lang="es-ES_tradnl" dirty="0"/>
+              <a:t>Objecto -&gt; métodos, aportan funcionamiento al objecto</a:t>
+            </a:r>
+          </a:p>
+          <a:p>
+            <a:endParaRPr lang="es-ES_tradnl" dirty="0"/>
+          </a:p>
+          <a:p>
+            <a:r>
+              <a:rPr lang="es-ES_tradnl" dirty="0"/>
+              <a:t>- Abstracción</a:t>
+            </a:r>
+          </a:p>
+        </p:txBody>
+      </p:sp>
+      <p:sp>
+        <p:nvSpPr>
+          <p:cNvPr id="2" name="TextBox 1">
+            <a:extLst>
+              <a:ext uri="{FF2B5EF4-FFF2-40B4-BE49-F238E27FC236}">
+                <a16:creationId xmlns:a16="http://schemas.microsoft.com/office/drawing/2014/main" id="{621303A2-104A-130C-2E5F-0147CABFE40D}"/>
+              </a:ext>
+            </a:extLst>
+          </p:cNvPr>
+          <p:cNvSpPr txBox="1"/>
+          <p:nvPr/>
+        </p:nvSpPr>
+        <p:spPr>
+          <a:xfrm>
+            <a:off x="1751527" y="2155601"/>
+            <a:ext cx="1986441" cy="369332"/>
+          </a:xfrm>
+          <a:prstGeom prst="rect">
+            <a:avLst/>
+          </a:prstGeom>
+          <a:noFill/>
+        </p:spPr>
+        <p:txBody>
+          <a:bodyPr wrap="none" rtlCol="0">
+            <a:spAutoFit/>
+          </a:bodyPr>
+          <a:lstStyle/>
+          <a:p>
+            <a:r>
+              <a:rPr lang="es-ES_tradnl" sz="1800" dirty="0"/>
+              <a:t>Objecto = Clase()</a:t>
+            </a:r>
+          </a:p>
+        </p:txBody>
+      </p:sp>
+      <p:sp>
+        <p:nvSpPr>
+          <p:cNvPr id="3" name="TextBox 2">
+            <a:extLst>
+              <a:ext uri="{FF2B5EF4-FFF2-40B4-BE49-F238E27FC236}">
+                <a16:creationId xmlns:a16="http://schemas.microsoft.com/office/drawing/2014/main" id="{A88D7489-1A3B-FCAE-CBD7-8EA20F3385F0}"/>
+              </a:ext>
+            </a:extLst>
+          </p:cNvPr>
+          <p:cNvSpPr txBox="1"/>
+          <p:nvPr/>
+        </p:nvSpPr>
+        <p:spPr>
+          <a:xfrm>
+            <a:off x="1532586" y="2660977"/>
+            <a:ext cx="4230645" cy="523220"/>
+          </a:xfrm>
+          <a:prstGeom prst="rect">
+            <a:avLst/>
+          </a:prstGeom>
+          <a:noFill/>
+        </p:spPr>
+        <p:txBody>
+          <a:bodyPr wrap="none" rtlCol="0">
+            <a:spAutoFit/>
+          </a:bodyPr>
+          <a:lstStyle/>
+          <a:p>
+            <a:r>
+              <a:rPr lang="es-ES_tradnl" dirty="0"/>
+              <a:t>Crear un método que permita registrar notas</a:t>
+            </a:r>
+          </a:p>
+          <a:p>
+            <a:r>
+              <a:rPr lang="es-ES_tradnl" dirty="0"/>
+              <a:t>Crea un </a:t>
+            </a:r>
+            <a:r>
+              <a:rPr lang="es-ES_tradnl" dirty="0" err="1"/>
+              <a:t>metodo</a:t>
+            </a:r>
+            <a:r>
+              <a:rPr lang="es-ES_tradnl" dirty="0"/>
+              <a:t> que obtenga el promedio de notas</a:t>
+            </a:r>
+          </a:p>
+        </p:txBody>
+      </p:sp>
+      <p:sp>
+        <p:nvSpPr>
+          <p:cNvPr id="6" name="TextBox 5">
+            <a:extLst>
+              <a:ext uri="{FF2B5EF4-FFF2-40B4-BE49-F238E27FC236}">
+                <a16:creationId xmlns:a16="http://schemas.microsoft.com/office/drawing/2014/main" id="{5EAD3746-D6C4-AECA-7C09-C5C798C60012}"/>
+              </a:ext>
+            </a:extLst>
+          </p:cNvPr>
+          <p:cNvSpPr txBox="1"/>
+          <p:nvPr/>
+        </p:nvSpPr>
+        <p:spPr>
+          <a:xfrm>
+            <a:off x="1899634" y="3548130"/>
+            <a:ext cx="3886000" cy="523220"/>
+          </a:xfrm>
+          <a:prstGeom prst="rect">
+            <a:avLst/>
+          </a:prstGeom>
+          <a:noFill/>
+        </p:spPr>
+        <p:txBody>
+          <a:bodyPr wrap="none" rtlCol="0">
+            <a:spAutoFit/>
+          </a:bodyPr>
+          <a:lstStyle/>
+          <a:p>
+            <a:r>
+              <a:rPr lang="es-ES_tradnl" dirty="0" err="1"/>
+              <a:t>Metodo_registrar</a:t>
+            </a:r>
+            <a:r>
+              <a:rPr lang="es-ES_tradnl" dirty="0"/>
+              <a:t>(nota).  -&gt; guardo en una lista</a:t>
+            </a:r>
+          </a:p>
+          <a:p>
+            <a:r>
+              <a:rPr lang="es-ES_tradnl" dirty="0" err="1"/>
+              <a:t>Metodo_promedio</a:t>
+            </a:r>
+            <a:r>
+              <a:rPr lang="es-ES_tradnl" dirty="0"/>
+              <a:t>() -&gt; sum(notas)/</a:t>
+            </a:r>
+            <a:r>
+              <a:rPr lang="es-ES_tradnl" dirty="0" err="1"/>
+              <a:t>len</a:t>
+            </a:r>
+            <a:r>
+              <a:rPr lang="es-ES_tradnl"/>
+              <a:t>(notas)</a:t>
+            </a:r>
+            <a:endParaRPr lang="es-ES_tradnl" dirty="0"/>
+          </a:p>
+        </p:txBody>
+      </p:sp>
+    </p:spTree>
+    <p:extLst>
+      <p:ext uri="{BB962C8B-B14F-4D97-AF65-F5344CB8AC3E}">
+        <p14:creationId xmlns:p14="http://schemas.microsoft.com/office/powerpoint/2010/main" val="1132531594"/>
+      </p:ext>
+    </p:extLst>
+  </p:cSld>
+  <p:clrMapOvr>
+    <a:masterClrMapping/>
+  </p:clrMapOvr>
+</p:sld>
+</file>
+
+<file path=ppt/slides/slide7.xml><?xml version="1.0" encoding="utf-8"?>
+<p:sld xmlns:a="http://schemas.openxmlformats.org/drawingml/2006/main" xmlns:r="http://schemas.openxmlformats.org/officeDocument/2006/relationships" xmlns:p="http://schemas.openxmlformats.org/presentationml/2006/main">
+  <p:cSld>
+    <p:spTree>
+      <p:nvGrpSpPr>
+        <p:cNvPr id="1" name="Shape 876"/>
+        <p:cNvGrpSpPr/>
+        <p:nvPr/>
+      </p:nvGrpSpPr>
+      <p:grpSpPr>
+        <a:xfrm>
+          <a:off x="0" y="0"/>
+          <a:ext cx="0" cy="0"/>
+          <a:chOff x="0" y="0"/>
+          <a:chExt cx="0" cy="0"/>
+        </a:xfrm>
+      </p:grpSpPr>
+      <p:sp>
+        <p:nvSpPr>
           <p:cNvPr id="877" name="Google Shape;877;p13"/>
           <p:cNvSpPr txBox="1">
             <a:spLocks noGrp="1"/>
@@ -19247,7 +19582,7 @@
             </a:br>
             <a:r>
               <a:rPr lang="es-ES_tradnl" dirty="0"/>
-              <a:t>Receso hasta las 21:20</a:t>
+              <a:t>Receso hasta las 21:15</a:t>
             </a:r>
           </a:p>
         </p:txBody>

</xml_diff>

<commit_message>
lesson 5 and pptx
</commit_message>
<xml_diff>
--- a/Modulo-4/clase 2/laminas.pptx
+++ b/Modulo-4/clase 2/laminas.pptx
@@ -5,7 +5,7 @@
     <p:sldMasterId id="2147483659" r:id="rId1"/>
   </p:sldMasterIdLst>
   <p:notesMasterIdLst>
-    <p:notesMasterId r:id="rId9"/>
+    <p:notesMasterId r:id="rId13"/>
   </p:notesMasterIdLst>
   <p:sldIdLst>
     <p:sldId id="256" r:id="rId2"/>
@@ -14,22 +14,26 @@
     <p:sldId id="264" r:id="rId5"/>
     <p:sldId id="265" r:id="rId6"/>
     <p:sldId id="266" r:id="rId7"/>
-    <p:sldId id="262" r:id="rId8"/>
+    <p:sldId id="267" r:id="rId8"/>
+    <p:sldId id="262" r:id="rId9"/>
+    <p:sldId id="269" r:id="rId10"/>
+    <p:sldId id="270" r:id="rId11"/>
+    <p:sldId id="268" r:id="rId12"/>
   </p:sldIdLst>
   <p:sldSz cx="9144000" cy="5143500" type="screen16x9"/>
   <p:notesSz cx="6858000" cy="9144000"/>
   <p:embeddedFontLst>
     <p:embeddedFont>
       <p:font typeface="Calibri" panose="020F0502020204030204" pitchFamily="34" charset="0"/>
-      <p:regular r:id="rId10"/>
-      <p:bold r:id="rId11"/>
-      <p:italic r:id="rId12"/>
-      <p:boldItalic r:id="rId13"/>
+      <p:regular r:id="rId14"/>
+      <p:bold r:id="rId15"/>
+      <p:italic r:id="rId16"/>
+      <p:boldItalic r:id="rId17"/>
     </p:embeddedFont>
     <p:embeddedFont>
       <p:font typeface="Space Grotesk Light" pitchFamily="2" charset="77"/>
-      <p:regular r:id="rId14"/>
-      <p:bold r:id="rId15"/>
+      <p:regular r:id="rId18"/>
+      <p:bold r:id="rId19"/>
     </p:embeddedFont>
   </p:embeddedFontLst>
   <p:defaultTextStyle>
@@ -814,6 +818,115 @@
 </p:notes>
 </file>
 
+<file path=ppt/notesSlides/notesSlide10.xml><?xml version="1.0" encoding="utf-8"?>
+<p:notes xmlns:a="http://schemas.openxmlformats.org/drawingml/2006/main" xmlns:r="http://schemas.openxmlformats.org/officeDocument/2006/relationships" xmlns:p="http://schemas.openxmlformats.org/presentationml/2006/main" showMasterSp="0" showMasterPhAnim="0">
+  <p:cSld>
+    <p:spTree>
+      <p:nvGrpSpPr>
+        <p:cNvPr id="1" name="Shape 873"/>
+        <p:cNvGrpSpPr/>
+        <p:nvPr/>
+      </p:nvGrpSpPr>
+      <p:grpSpPr>
+        <a:xfrm>
+          <a:off x="0" y="0"/>
+          <a:ext cx="0" cy="0"/>
+          <a:chOff x="0" y="0"/>
+          <a:chExt cx="0" cy="0"/>
+        </a:xfrm>
+      </p:grpSpPr>
+      <p:sp>
+        <p:nvSpPr>
+          <p:cNvPr id="874" name="Google Shape;874;g35f391192_00:notes"/>
+          <p:cNvSpPr>
+            <a:spLocks noGrp="1" noRot="1" noChangeAspect="1"/>
+          </p:cNvSpPr>
+          <p:nvPr>
+            <p:ph type="sldImg" idx="2"/>
+          </p:nvPr>
+        </p:nvSpPr>
+        <p:spPr>
+          <a:xfrm>
+            <a:off x="381000" y="685800"/>
+            <a:ext cx="6096000" cy="3429000"/>
+          </a:xfrm>
+          <a:custGeom>
+            <a:avLst/>
+            <a:gdLst/>
+            <a:ahLst/>
+            <a:cxnLst/>
+            <a:rect l="l" t="t" r="r" b="b"/>
+            <a:pathLst>
+              <a:path w="120000" h="120000" extrusionOk="0">
+                <a:moveTo>
+                  <a:pt x="0" y="0"/>
+                </a:moveTo>
+                <a:lnTo>
+                  <a:pt x="120000" y="0"/>
+                </a:lnTo>
+                <a:lnTo>
+                  <a:pt x="120000" y="120000"/>
+                </a:lnTo>
+                <a:lnTo>
+                  <a:pt x="0" y="120000"/>
+                </a:lnTo>
+                <a:close/>
+              </a:path>
+            </a:pathLst>
+          </a:custGeom>
+        </p:spPr>
+      </p:sp>
+      <p:sp>
+        <p:nvSpPr>
+          <p:cNvPr id="875" name="Google Shape;875;g35f391192_00:notes"/>
+          <p:cNvSpPr txBox="1">
+            <a:spLocks noGrp="1"/>
+          </p:cNvSpPr>
+          <p:nvPr>
+            <p:ph type="body" idx="1"/>
+          </p:nvPr>
+        </p:nvSpPr>
+        <p:spPr>
+          <a:xfrm>
+            <a:off x="685800" y="4343400"/>
+            <a:ext cx="5486400" cy="4114800"/>
+          </a:xfrm>
+          <a:prstGeom prst="rect">
+            <a:avLst/>
+          </a:prstGeom>
+        </p:spPr>
+        <p:txBody>
+          <a:bodyPr spcFirstLastPara="1" wrap="square" lIns="91425" tIns="91425" rIns="91425" bIns="91425" anchor="t" anchorCtr="0">
+            <a:noAutofit/>
+          </a:bodyPr>
+          <a:lstStyle/>
+          <a:p>
+            <a:pPr marL="0" lvl="0" indent="0" algn="l" rtl="0">
+              <a:spcBef>
+                <a:spcPts val="0"/>
+              </a:spcBef>
+              <a:spcAft>
+                <a:spcPts val="0"/>
+              </a:spcAft>
+              <a:buNone/>
+            </a:pPr>
+            <a:endParaRPr/>
+          </a:p>
+        </p:txBody>
+      </p:sp>
+    </p:spTree>
+    <p:extLst>
+      <p:ext uri="{BB962C8B-B14F-4D97-AF65-F5344CB8AC3E}">
+        <p14:creationId xmlns:p14="http://schemas.microsoft.com/office/powerpoint/2010/main" val="2065925880"/>
+      </p:ext>
+    </p:extLst>
+  </p:cSld>
+  <p:clrMapOvr>
+    <a:masterClrMapping/>
+  </p:clrMapOvr>
+</p:notes>
+</file>
+
 <file path=ppt/notesSlides/notesSlide2.xml><?xml version="1.0" encoding="utf-8"?>
 <p:notes xmlns:a="http://schemas.openxmlformats.org/drawingml/2006/main" xmlns:r="http://schemas.openxmlformats.org/officeDocument/2006/relationships" xmlns:p="http://schemas.openxmlformats.org/presentationml/2006/main" showMasterSp="0" showMasterPhAnim="0">
   <p:cSld>
@@ -1446,7 +1559,116 @@
               </a:spcAft>
               <a:buNone/>
             </a:pPr>
-            <a:endParaRPr/>
+            <a:endParaRPr dirty="0"/>
+          </a:p>
+        </p:txBody>
+      </p:sp>
+    </p:spTree>
+    <p:extLst>
+      <p:ext uri="{BB962C8B-B14F-4D97-AF65-F5344CB8AC3E}">
+        <p14:creationId xmlns:p14="http://schemas.microsoft.com/office/powerpoint/2010/main" val="2784151710"/>
+      </p:ext>
+    </p:extLst>
+  </p:cSld>
+  <p:clrMapOvr>
+    <a:masterClrMapping/>
+  </p:clrMapOvr>
+</p:notes>
+</file>
+
+<file path=ppt/notesSlides/notesSlide8.xml><?xml version="1.0" encoding="utf-8"?>
+<p:notes xmlns:a="http://schemas.openxmlformats.org/drawingml/2006/main" xmlns:r="http://schemas.openxmlformats.org/officeDocument/2006/relationships" xmlns:p="http://schemas.openxmlformats.org/presentationml/2006/main" showMasterSp="0" showMasterPhAnim="0">
+  <p:cSld>
+    <p:spTree>
+      <p:nvGrpSpPr>
+        <p:cNvPr id="1" name="Shape 873"/>
+        <p:cNvGrpSpPr/>
+        <p:nvPr/>
+      </p:nvGrpSpPr>
+      <p:grpSpPr>
+        <a:xfrm>
+          <a:off x="0" y="0"/>
+          <a:ext cx="0" cy="0"/>
+          <a:chOff x="0" y="0"/>
+          <a:chExt cx="0" cy="0"/>
+        </a:xfrm>
+      </p:grpSpPr>
+      <p:sp>
+        <p:nvSpPr>
+          <p:cNvPr id="874" name="Google Shape;874;g35f391192_00:notes"/>
+          <p:cNvSpPr>
+            <a:spLocks noGrp="1" noRot="1" noChangeAspect="1"/>
+          </p:cNvSpPr>
+          <p:nvPr>
+            <p:ph type="sldImg" idx="2"/>
+          </p:nvPr>
+        </p:nvSpPr>
+        <p:spPr>
+          <a:xfrm>
+            <a:off x="381000" y="685800"/>
+            <a:ext cx="6096000" cy="3429000"/>
+          </a:xfrm>
+          <a:custGeom>
+            <a:avLst/>
+            <a:gdLst/>
+            <a:ahLst/>
+            <a:cxnLst/>
+            <a:rect l="l" t="t" r="r" b="b"/>
+            <a:pathLst>
+              <a:path w="120000" h="120000" extrusionOk="0">
+                <a:moveTo>
+                  <a:pt x="0" y="0"/>
+                </a:moveTo>
+                <a:lnTo>
+                  <a:pt x="120000" y="0"/>
+                </a:lnTo>
+                <a:lnTo>
+                  <a:pt x="120000" y="120000"/>
+                </a:lnTo>
+                <a:lnTo>
+                  <a:pt x="0" y="120000"/>
+                </a:lnTo>
+                <a:close/>
+              </a:path>
+            </a:pathLst>
+          </a:custGeom>
+        </p:spPr>
+      </p:sp>
+      <p:sp>
+        <p:nvSpPr>
+          <p:cNvPr id="875" name="Google Shape;875;g35f391192_00:notes"/>
+          <p:cNvSpPr txBox="1">
+            <a:spLocks noGrp="1"/>
+          </p:cNvSpPr>
+          <p:nvPr>
+            <p:ph type="body" idx="1"/>
+          </p:nvPr>
+        </p:nvSpPr>
+        <p:spPr>
+          <a:xfrm>
+            <a:off x="685800" y="4343400"/>
+            <a:ext cx="5486400" cy="4114800"/>
+          </a:xfrm>
+          <a:prstGeom prst="rect">
+            <a:avLst/>
+          </a:prstGeom>
+        </p:spPr>
+        <p:txBody>
+          <a:bodyPr spcFirstLastPara="1" wrap="square" lIns="91425" tIns="91425" rIns="91425" bIns="91425" anchor="t" anchorCtr="0">
+            <a:noAutofit/>
+          </a:bodyPr>
+          <a:lstStyle/>
+          <a:p>
+            <a:pPr marL="0" lvl="0" indent="0" algn="l" rtl="0">
+              <a:spcBef>
+                <a:spcPts val="0"/>
+              </a:spcBef>
+              <a:spcAft>
+                <a:spcPts val="0"/>
+              </a:spcAft>
+              <a:buNone/>
+            </a:pPr>
+            <a:endParaRPr dirty="0"/>
           </a:p>
         </p:txBody>
       </p:sp>
@@ -1454,6 +1676,115 @@
     <p:extLst>
       <p:ext uri="{BB962C8B-B14F-4D97-AF65-F5344CB8AC3E}">
         <p14:creationId xmlns:p14="http://schemas.microsoft.com/office/powerpoint/2010/main" val="2869556282"/>
+      </p:ext>
+    </p:extLst>
+  </p:cSld>
+  <p:clrMapOvr>
+    <a:masterClrMapping/>
+  </p:clrMapOvr>
+</p:notes>
+</file>
+
+<file path=ppt/notesSlides/notesSlide9.xml><?xml version="1.0" encoding="utf-8"?>
+<p:notes xmlns:a="http://schemas.openxmlformats.org/drawingml/2006/main" xmlns:r="http://schemas.openxmlformats.org/officeDocument/2006/relationships" xmlns:p="http://schemas.openxmlformats.org/presentationml/2006/main" showMasterSp="0" showMasterPhAnim="0">
+  <p:cSld>
+    <p:spTree>
+      <p:nvGrpSpPr>
+        <p:cNvPr id="1" name="Shape 873"/>
+        <p:cNvGrpSpPr/>
+        <p:nvPr/>
+      </p:nvGrpSpPr>
+      <p:grpSpPr>
+        <a:xfrm>
+          <a:off x="0" y="0"/>
+          <a:ext cx="0" cy="0"/>
+          <a:chOff x="0" y="0"/>
+          <a:chExt cx="0" cy="0"/>
+        </a:xfrm>
+      </p:grpSpPr>
+      <p:sp>
+        <p:nvSpPr>
+          <p:cNvPr id="874" name="Google Shape;874;g35f391192_00:notes"/>
+          <p:cNvSpPr>
+            <a:spLocks noGrp="1" noRot="1" noChangeAspect="1"/>
+          </p:cNvSpPr>
+          <p:nvPr>
+            <p:ph type="sldImg" idx="2"/>
+          </p:nvPr>
+        </p:nvSpPr>
+        <p:spPr>
+          <a:xfrm>
+            <a:off x="381000" y="685800"/>
+            <a:ext cx="6096000" cy="3429000"/>
+          </a:xfrm>
+          <a:custGeom>
+            <a:avLst/>
+            <a:gdLst/>
+            <a:ahLst/>
+            <a:cxnLst/>
+            <a:rect l="l" t="t" r="r" b="b"/>
+            <a:pathLst>
+              <a:path w="120000" h="120000" extrusionOk="0">
+                <a:moveTo>
+                  <a:pt x="0" y="0"/>
+                </a:moveTo>
+                <a:lnTo>
+                  <a:pt x="120000" y="0"/>
+                </a:lnTo>
+                <a:lnTo>
+                  <a:pt x="120000" y="120000"/>
+                </a:lnTo>
+                <a:lnTo>
+                  <a:pt x="0" y="120000"/>
+                </a:lnTo>
+                <a:close/>
+              </a:path>
+            </a:pathLst>
+          </a:custGeom>
+        </p:spPr>
+      </p:sp>
+      <p:sp>
+        <p:nvSpPr>
+          <p:cNvPr id="875" name="Google Shape;875;g35f391192_00:notes"/>
+          <p:cNvSpPr txBox="1">
+            <a:spLocks noGrp="1"/>
+          </p:cNvSpPr>
+          <p:nvPr>
+            <p:ph type="body" idx="1"/>
+          </p:nvPr>
+        </p:nvSpPr>
+        <p:spPr>
+          <a:xfrm>
+            <a:off x="685800" y="4343400"/>
+            <a:ext cx="5486400" cy="4114800"/>
+          </a:xfrm>
+          <a:prstGeom prst="rect">
+            <a:avLst/>
+          </a:prstGeom>
+        </p:spPr>
+        <p:txBody>
+          <a:bodyPr spcFirstLastPara="1" wrap="square" lIns="91425" tIns="91425" rIns="91425" bIns="91425" anchor="t" anchorCtr="0">
+            <a:noAutofit/>
+          </a:bodyPr>
+          <a:lstStyle/>
+          <a:p>
+            <a:pPr marL="0" lvl="0" indent="0" algn="l" rtl="0">
+              <a:spcBef>
+                <a:spcPts val="0"/>
+              </a:spcBef>
+              <a:spcAft>
+                <a:spcPts val="0"/>
+              </a:spcAft>
+              <a:buNone/>
+            </a:pPr>
+            <a:endParaRPr dirty="0"/>
+          </a:p>
+        </p:txBody>
+      </p:sp>
+    </p:spTree>
+    <p:extLst>
+      <p:ext uri="{BB962C8B-B14F-4D97-AF65-F5344CB8AC3E}">
+        <p14:creationId xmlns:p14="http://schemas.microsoft.com/office/powerpoint/2010/main" val="2248067141"/>
       </p:ext>
     </p:extLst>
   </p:cSld>
@@ -16741,6 +17072,575 @@
 </p:sld>
 </file>
 
+<file path=ppt/slides/slide10.xml><?xml version="1.0" encoding="utf-8"?>
+<p:sld xmlns:a="http://schemas.openxmlformats.org/drawingml/2006/main" xmlns:r="http://schemas.openxmlformats.org/officeDocument/2006/relationships" xmlns:p="http://schemas.openxmlformats.org/presentationml/2006/main">
+  <p:cSld>
+    <p:spTree>
+      <p:nvGrpSpPr>
+        <p:cNvPr id="1" name=""/>
+        <p:cNvGrpSpPr/>
+        <p:nvPr/>
+      </p:nvGrpSpPr>
+      <p:grpSpPr>
+        <a:xfrm>
+          <a:off x="0" y="0"/>
+          <a:ext cx="0" cy="0"/>
+          <a:chOff x="0" y="0"/>
+          <a:chExt cx="0" cy="0"/>
+        </a:xfrm>
+      </p:grpSpPr>
+      <p:sp>
+        <p:nvSpPr>
+          <p:cNvPr id="4" name="TextBox 3">
+            <a:extLst>
+              <a:ext uri="{FF2B5EF4-FFF2-40B4-BE49-F238E27FC236}">
+                <a16:creationId xmlns:a16="http://schemas.microsoft.com/office/drawing/2014/main" id="{75C54F75-F0A9-A7BA-E669-CD8B153D5355}"/>
+              </a:ext>
+            </a:extLst>
+          </p:cNvPr>
+          <p:cNvSpPr txBox="1"/>
+          <p:nvPr/>
+        </p:nvSpPr>
+        <p:spPr>
+          <a:xfrm>
+            <a:off x="779172" y="804930"/>
+            <a:ext cx="7337103" cy="2462213"/>
+          </a:xfrm>
+          <a:prstGeom prst="rect">
+            <a:avLst/>
+          </a:prstGeom>
+          <a:noFill/>
+        </p:spPr>
+        <p:txBody>
+          <a:bodyPr wrap="square" rtlCol="0">
+            <a:spAutoFit/>
+          </a:bodyPr>
+          <a:lstStyle/>
+          <a:p>
+            <a:r>
+              <a:rPr lang="es-ES_tradnl" dirty="0"/>
+              <a:t>Accedemos a los atributos</a:t>
+            </a:r>
+          </a:p>
+          <a:p>
+            <a:endParaRPr lang="es-ES_tradnl" dirty="0"/>
+          </a:p>
+          <a:p>
+            <a:pPr marL="285750" indent="-285750">
+              <a:buFont typeface="Arial" panose="020B0604020202020204" pitchFamily="34" charset="0"/>
+              <a:buChar char="•"/>
+            </a:pPr>
+            <a:r>
+              <a:rPr lang="es-ES_tradnl" dirty="0"/>
+              <a:t>Públicos – por defecto todos los atributos de una clase en Python son publico</a:t>
+            </a:r>
+          </a:p>
+          <a:p>
+            <a:pPr marL="285750" indent="-285750">
+              <a:buFont typeface="Arial" panose="020B0604020202020204" pitchFamily="34" charset="0"/>
+              <a:buChar char="•"/>
+            </a:pPr>
+            <a:r>
+              <a:rPr lang="es-ES_tradnl" dirty="0"/>
+              <a:t>Privado</a:t>
+            </a:r>
+          </a:p>
+          <a:p>
+            <a:pPr marL="285750" indent="-285750">
+              <a:buFont typeface="Arial" panose="020B0604020202020204" pitchFamily="34" charset="0"/>
+              <a:buChar char="•"/>
+            </a:pPr>
+            <a:endParaRPr lang="es-ES_tradnl" dirty="0"/>
+          </a:p>
+          <a:p>
+            <a:pPr marL="285750" lvl="1" indent="-285750">
+              <a:buFont typeface="Arial" panose="020B0604020202020204" pitchFamily="34" charset="0"/>
+              <a:buChar char="•"/>
+            </a:pPr>
+            <a:r>
+              <a:rPr lang="es-ES_tradnl" dirty="0"/>
+              <a:t>@</a:t>
+            </a:r>
+            <a:r>
+              <a:rPr lang="es-ES_tradnl" dirty="0" err="1"/>
+              <a:t>property</a:t>
+            </a:r>
+            <a:r>
+              <a:rPr lang="es-ES_tradnl" dirty="0"/>
+              <a:t>	-&gt; devolver el valor de un atributo privado</a:t>
+            </a:r>
+          </a:p>
+          <a:p>
+            <a:pPr marL="285750" lvl="1" indent="-285750">
+              <a:buFont typeface="Arial" panose="020B0604020202020204" pitchFamily="34" charset="0"/>
+              <a:buChar char="•"/>
+            </a:pPr>
+            <a:r>
+              <a:rPr lang="es-ES_tradnl" dirty="0"/>
+              <a:t>@</a:t>
+            </a:r>
+            <a:r>
+              <a:rPr lang="es-ES_tradnl" dirty="0" err="1"/>
+              <a:t>variable.setter</a:t>
+            </a:r>
+            <a:r>
+              <a:rPr lang="es-ES_tradnl" dirty="0"/>
+              <a:t>     -&gt; modificar el atributo privado</a:t>
+            </a:r>
+          </a:p>
+          <a:p>
+            <a:pPr marL="285750" lvl="1" indent="-285750">
+              <a:buFont typeface="Arial" panose="020B0604020202020204" pitchFamily="34" charset="0"/>
+              <a:buChar char="•"/>
+            </a:pPr>
+            <a:endParaRPr lang="es-ES_tradnl" dirty="0"/>
+          </a:p>
+          <a:p>
+            <a:pPr marL="285750" lvl="1" indent="-285750">
+              <a:buFont typeface="Arial" panose="020B0604020202020204" pitchFamily="34" charset="0"/>
+              <a:buChar char="•"/>
+            </a:pPr>
+            <a:r>
+              <a:rPr lang="es-ES_tradnl" dirty="0"/>
+              <a:t>__</a:t>
+            </a:r>
+            <a:r>
+              <a:rPr lang="es-ES_tradnl" dirty="0" err="1"/>
+              <a:t>name</a:t>
+            </a:r>
+            <a:r>
+              <a:rPr lang="es-ES_tradnl" dirty="0"/>
+              <a:t> -&gt; al colocar doble _ como prefijo a una variable lo convierte en privada</a:t>
+            </a:r>
+          </a:p>
+          <a:p>
+            <a:pPr marL="285750" lvl="1" indent="-285750">
+              <a:buFont typeface="Arial" panose="020B0604020202020204" pitchFamily="34" charset="0"/>
+              <a:buChar char="•"/>
+            </a:pPr>
+            <a:endParaRPr lang="es-ES_tradnl" dirty="0"/>
+          </a:p>
+          <a:p>
+            <a:pPr marL="285750" lvl="1" indent="-285750">
+              <a:buFont typeface="Arial" panose="020B0604020202020204" pitchFamily="34" charset="0"/>
+              <a:buChar char="•"/>
+            </a:pPr>
+            <a:r>
+              <a:rPr lang="es-ES_tradnl" dirty="0"/>
+              <a:t>@</a:t>
+            </a:r>
+            <a:r>
+              <a:rPr lang="es-ES_tradnl" dirty="0" err="1"/>
+              <a:t>classmethod</a:t>
+            </a:r>
+            <a:r>
+              <a:rPr lang="es-ES_tradnl" dirty="0"/>
+              <a:t>	-&gt; devolver o modificar una variable de clase</a:t>
+            </a:r>
+          </a:p>
+        </p:txBody>
+      </p:sp>
+    </p:spTree>
+    <p:extLst>
+      <p:ext uri="{BB962C8B-B14F-4D97-AF65-F5344CB8AC3E}">
+        <p14:creationId xmlns:p14="http://schemas.microsoft.com/office/powerpoint/2010/main" val="3274765711"/>
+      </p:ext>
+    </p:extLst>
+  </p:cSld>
+  <p:clrMapOvr>
+    <a:masterClrMapping/>
+  </p:clrMapOvr>
+</p:sld>
+</file>
+
+<file path=ppt/slides/slide11.xml><?xml version="1.0" encoding="utf-8"?>
+<p:sld xmlns:a="http://schemas.openxmlformats.org/drawingml/2006/main" xmlns:r="http://schemas.openxmlformats.org/officeDocument/2006/relationships" xmlns:p="http://schemas.openxmlformats.org/presentationml/2006/main">
+  <p:cSld>
+    <p:spTree>
+      <p:nvGrpSpPr>
+        <p:cNvPr id="1" name="Shape 876"/>
+        <p:cNvGrpSpPr/>
+        <p:nvPr/>
+      </p:nvGrpSpPr>
+      <p:grpSpPr>
+        <a:xfrm>
+          <a:off x="0" y="0"/>
+          <a:ext cx="0" cy="0"/>
+          <a:chOff x="0" y="0"/>
+          <a:chExt cx="0" cy="0"/>
+        </a:xfrm>
+      </p:grpSpPr>
+      <p:sp>
+        <p:nvSpPr>
+          <p:cNvPr id="877" name="Google Shape;877;p13"/>
+          <p:cNvSpPr txBox="1">
+            <a:spLocks noGrp="1"/>
+          </p:cNvSpPr>
+          <p:nvPr>
+            <p:ph type="ctrTitle"/>
+          </p:nvPr>
+        </p:nvSpPr>
+        <p:spPr>
+          <a:xfrm>
+            <a:off x="0" y="1886894"/>
+            <a:ext cx="9047408" cy="1159800"/>
+          </a:xfrm>
+          <a:prstGeom prst="rect">
+            <a:avLst/>
+          </a:prstGeom>
+        </p:spPr>
+        <p:txBody>
+          <a:bodyPr spcFirstLastPara="1" wrap="square" lIns="0" tIns="0" rIns="0" bIns="0" anchor="ctr" anchorCtr="0">
+            <a:noAutofit/>
+          </a:bodyPr>
+          <a:lstStyle/>
+          <a:p>
+            <a:pPr marL="0" lvl="0" indent="0" algn="ctr" rtl="0">
+              <a:spcBef>
+                <a:spcPts val="0"/>
+              </a:spcBef>
+              <a:spcAft>
+                <a:spcPts val="0"/>
+              </a:spcAft>
+              <a:buNone/>
+            </a:pPr>
+            <a:r>
+              <a:rPr lang="es-ES_tradnl" dirty="0"/>
+              <a:t>E-Camp</a:t>
+            </a:r>
+            <a:br>
+              <a:rPr lang="es-ES_tradnl" dirty="0"/>
+            </a:br>
+            <a:r>
+              <a:rPr lang="es-ES_tradnl" dirty="0"/>
+              <a:t>Full </a:t>
+            </a:r>
+            <a:r>
+              <a:rPr lang="es-ES_tradnl" dirty="0" err="1"/>
+              <a:t>Stack</a:t>
+            </a:r>
+            <a:r>
+              <a:rPr lang="es-ES_tradnl" dirty="0"/>
+              <a:t> Python</a:t>
+            </a:r>
+            <a:br>
+              <a:rPr lang="es-ES_tradnl" dirty="0"/>
+            </a:br>
+            <a:br>
+              <a:rPr lang="es-ES_tradnl" dirty="0"/>
+            </a:br>
+            <a:r>
+              <a:rPr lang="es-ES_tradnl" dirty="0"/>
+              <a:t>Receso hasta </a:t>
+            </a:r>
+            <a:r>
+              <a:rPr lang="es-ES_tradnl"/>
+              <a:t>las 21:20</a:t>
+            </a:r>
+            <a:endParaRPr lang="es-ES_tradnl" dirty="0"/>
+          </a:p>
+        </p:txBody>
+      </p:sp>
+      <p:sp>
+        <p:nvSpPr>
+          <p:cNvPr id="2" name="Google Shape;882;p14">
+            <a:extLst>
+              <a:ext uri="{FF2B5EF4-FFF2-40B4-BE49-F238E27FC236}">
+                <a16:creationId xmlns:a16="http://schemas.microsoft.com/office/drawing/2014/main" id="{A63D419E-D1A2-1BC2-F5C8-342811140EB5}"/>
+              </a:ext>
+            </a:extLst>
+          </p:cNvPr>
+          <p:cNvSpPr txBox="1">
+            <a:spLocks/>
+          </p:cNvSpPr>
+          <p:nvPr/>
+        </p:nvSpPr>
+        <p:spPr>
+          <a:xfrm>
+            <a:off x="150762" y="4643502"/>
+            <a:ext cx="6240900" cy="396300"/>
+          </a:xfrm>
+          <a:prstGeom prst="rect">
+            <a:avLst/>
+          </a:prstGeom>
+          <a:noFill/>
+          <a:ln>
+            <a:noFill/>
+          </a:ln>
+        </p:spPr>
+        <p:txBody>
+          <a:bodyPr spcFirstLastPara="1" wrap="square" lIns="0" tIns="0" rIns="0" bIns="0" anchor="b" anchorCtr="0">
+            <a:noAutofit/>
+          </a:bodyPr>
+          <a:lstStyle>
+            <a:defPPr marR="0" lvl="0" algn="l" rtl="0">
+              <a:lnSpc>
+                <a:spcPct val="100000"/>
+              </a:lnSpc>
+              <a:spcBef>
+                <a:spcPts val="0"/>
+              </a:spcBef>
+              <a:spcAft>
+                <a:spcPts val="0"/>
+              </a:spcAft>
+            </a:defPPr>
+            <a:lvl1pPr marR="0" lvl="0" algn="ctr" rtl="0">
+              <a:lnSpc>
+                <a:spcPct val="90000"/>
+              </a:lnSpc>
+              <a:spcBef>
+                <a:spcPts val="0"/>
+              </a:spcBef>
+              <a:spcAft>
+                <a:spcPts val="0"/>
+              </a:spcAft>
+              <a:buClr>
+                <a:schemeClr val="dk1"/>
+              </a:buClr>
+              <a:buSzPts val="5800"/>
+              <a:buFont typeface="Space Grotesk Light"/>
+              <a:buNone/>
+              <a:defRPr sz="5800" b="0" i="0" u="none" strike="noStrike" cap="none">
+                <a:solidFill>
+                  <a:schemeClr val="dk1"/>
+                </a:solidFill>
+                <a:latin typeface="Space Grotesk Light"/>
+                <a:ea typeface="Space Grotesk Light"/>
+                <a:cs typeface="Space Grotesk Light"/>
+                <a:sym typeface="Space Grotesk Light"/>
+              </a:defRPr>
+            </a:lvl1pPr>
+            <a:lvl2pPr marR="0" lvl="1" algn="ctr" rtl="0">
+              <a:lnSpc>
+                <a:spcPct val="90000"/>
+              </a:lnSpc>
+              <a:spcBef>
+                <a:spcPts val="0"/>
+              </a:spcBef>
+              <a:spcAft>
+                <a:spcPts val="0"/>
+              </a:spcAft>
+              <a:buClr>
+                <a:schemeClr val="dk1"/>
+              </a:buClr>
+              <a:buSzPts val="5800"/>
+              <a:buFont typeface="Space Grotesk Light"/>
+              <a:buNone/>
+              <a:defRPr sz="5800" b="0" i="0" u="none" strike="noStrike" cap="none">
+                <a:solidFill>
+                  <a:schemeClr val="dk1"/>
+                </a:solidFill>
+                <a:latin typeface="Space Grotesk Light"/>
+                <a:ea typeface="Space Grotesk Light"/>
+                <a:cs typeface="Space Grotesk Light"/>
+                <a:sym typeface="Space Grotesk Light"/>
+              </a:defRPr>
+            </a:lvl2pPr>
+            <a:lvl3pPr marR="0" lvl="2" algn="ctr" rtl="0">
+              <a:lnSpc>
+                <a:spcPct val="90000"/>
+              </a:lnSpc>
+              <a:spcBef>
+                <a:spcPts val="0"/>
+              </a:spcBef>
+              <a:spcAft>
+                <a:spcPts val="0"/>
+              </a:spcAft>
+              <a:buClr>
+                <a:schemeClr val="dk1"/>
+              </a:buClr>
+              <a:buSzPts val="5800"/>
+              <a:buFont typeface="Space Grotesk Light"/>
+              <a:buNone/>
+              <a:defRPr sz="5800" b="0" i="0" u="none" strike="noStrike" cap="none">
+                <a:solidFill>
+                  <a:schemeClr val="dk1"/>
+                </a:solidFill>
+                <a:latin typeface="Space Grotesk Light"/>
+                <a:ea typeface="Space Grotesk Light"/>
+                <a:cs typeface="Space Grotesk Light"/>
+                <a:sym typeface="Space Grotesk Light"/>
+              </a:defRPr>
+            </a:lvl3pPr>
+            <a:lvl4pPr marR="0" lvl="3" algn="ctr" rtl="0">
+              <a:lnSpc>
+                <a:spcPct val="90000"/>
+              </a:lnSpc>
+              <a:spcBef>
+                <a:spcPts val="0"/>
+              </a:spcBef>
+              <a:spcAft>
+                <a:spcPts val="0"/>
+              </a:spcAft>
+              <a:buClr>
+                <a:schemeClr val="dk1"/>
+              </a:buClr>
+              <a:buSzPts val="5800"/>
+              <a:buFont typeface="Space Grotesk Light"/>
+              <a:buNone/>
+              <a:defRPr sz="5800" b="0" i="0" u="none" strike="noStrike" cap="none">
+                <a:solidFill>
+                  <a:schemeClr val="dk1"/>
+                </a:solidFill>
+                <a:latin typeface="Space Grotesk Light"/>
+                <a:ea typeface="Space Grotesk Light"/>
+                <a:cs typeface="Space Grotesk Light"/>
+                <a:sym typeface="Space Grotesk Light"/>
+              </a:defRPr>
+            </a:lvl4pPr>
+            <a:lvl5pPr marR="0" lvl="4" algn="ctr" rtl="0">
+              <a:lnSpc>
+                <a:spcPct val="90000"/>
+              </a:lnSpc>
+              <a:spcBef>
+                <a:spcPts val="0"/>
+              </a:spcBef>
+              <a:spcAft>
+                <a:spcPts val="0"/>
+              </a:spcAft>
+              <a:buClr>
+                <a:schemeClr val="dk1"/>
+              </a:buClr>
+              <a:buSzPts val="5800"/>
+              <a:buFont typeface="Space Grotesk Light"/>
+              <a:buNone/>
+              <a:defRPr sz="5800" b="0" i="0" u="none" strike="noStrike" cap="none">
+                <a:solidFill>
+                  <a:schemeClr val="dk1"/>
+                </a:solidFill>
+                <a:latin typeface="Space Grotesk Light"/>
+                <a:ea typeface="Space Grotesk Light"/>
+                <a:cs typeface="Space Grotesk Light"/>
+                <a:sym typeface="Space Grotesk Light"/>
+              </a:defRPr>
+            </a:lvl5pPr>
+            <a:lvl6pPr marR="0" lvl="5" algn="ctr" rtl="0">
+              <a:lnSpc>
+                <a:spcPct val="90000"/>
+              </a:lnSpc>
+              <a:spcBef>
+                <a:spcPts val="0"/>
+              </a:spcBef>
+              <a:spcAft>
+                <a:spcPts val="0"/>
+              </a:spcAft>
+              <a:buClr>
+                <a:schemeClr val="dk1"/>
+              </a:buClr>
+              <a:buSzPts val="5800"/>
+              <a:buFont typeface="Space Grotesk Light"/>
+              <a:buNone/>
+              <a:defRPr sz="5800" b="0" i="0" u="none" strike="noStrike" cap="none">
+                <a:solidFill>
+                  <a:schemeClr val="dk1"/>
+                </a:solidFill>
+                <a:latin typeface="Space Grotesk Light"/>
+                <a:ea typeface="Space Grotesk Light"/>
+                <a:cs typeface="Space Grotesk Light"/>
+                <a:sym typeface="Space Grotesk Light"/>
+              </a:defRPr>
+            </a:lvl6pPr>
+            <a:lvl7pPr marR="0" lvl="6" algn="ctr" rtl="0">
+              <a:lnSpc>
+                <a:spcPct val="90000"/>
+              </a:lnSpc>
+              <a:spcBef>
+                <a:spcPts val="0"/>
+              </a:spcBef>
+              <a:spcAft>
+                <a:spcPts val="0"/>
+              </a:spcAft>
+              <a:buClr>
+                <a:schemeClr val="dk1"/>
+              </a:buClr>
+              <a:buSzPts val="5800"/>
+              <a:buFont typeface="Space Grotesk Light"/>
+              <a:buNone/>
+              <a:defRPr sz="5800" b="0" i="0" u="none" strike="noStrike" cap="none">
+                <a:solidFill>
+                  <a:schemeClr val="dk1"/>
+                </a:solidFill>
+                <a:latin typeface="Space Grotesk Light"/>
+                <a:ea typeface="Space Grotesk Light"/>
+                <a:cs typeface="Space Grotesk Light"/>
+                <a:sym typeface="Space Grotesk Light"/>
+              </a:defRPr>
+            </a:lvl7pPr>
+            <a:lvl8pPr marR="0" lvl="7" algn="ctr" rtl="0">
+              <a:lnSpc>
+                <a:spcPct val="90000"/>
+              </a:lnSpc>
+              <a:spcBef>
+                <a:spcPts val="0"/>
+              </a:spcBef>
+              <a:spcAft>
+                <a:spcPts val="0"/>
+              </a:spcAft>
+              <a:buClr>
+                <a:schemeClr val="dk1"/>
+              </a:buClr>
+              <a:buSzPts val="5800"/>
+              <a:buFont typeface="Space Grotesk Light"/>
+              <a:buNone/>
+              <a:defRPr sz="5800" b="0" i="0" u="none" strike="noStrike" cap="none">
+                <a:solidFill>
+                  <a:schemeClr val="dk1"/>
+                </a:solidFill>
+                <a:latin typeface="Space Grotesk Light"/>
+                <a:ea typeface="Space Grotesk Light"/>
+                <a:cs typeface="Space Grotesk Light"/>
+                <a:sym typeface="Space Grotesk Light"/>
+              </a:defRPr>
+            </a:lvl8pPr>
+            <a:lvl9pPr marR="0" lvl="8" algn="ctr" rtl="0">
+              <a:lnSpc>
+                <a:spcPct val="90000"/>
+              </a:lnSpc>
+              <a:spcBef>
+                <a:spcPts val="0"/>
+              </a:spcBef>
+              <a:spcAft>
+                <a:spcPts val="0"/>
+              </a:spcAft>
+              <a:buClr>
+                <a:schemeClr val="dk1"/>
+              </a:buClr>
+              <a:buSzPts val="5800"/>
+              <a:buFont typeface="Space Grotesk Light"/>
+              <a:buNone/>
+              <a:defRPr sz="5800" b="0" i="0" u="none" strike="noStrike" cap="none">
+                <a:solidFill>
+                  <a:schemeClr val="dk1"/>
+                </a:solidFill>
+                <a:latin typeface="Space Grotesk Light"/>
+                <a:ea typeface="Space Grotesk Light"/>
+                <a:cs typeface="Space Grotesk Light"/>
+                <a:sym typeface="Space Grotesk Light"/>
+              </a:defRPr>
+            </a:lvl9pPr>
+          </a:lstStyle>
+          <a:p>
+            <a:pPr algn="l"/>
+            <a:r>
+              <a:rPr lang="es-ES_tradnl" sz="2800"/>
+              <a:t>Richar Lujano</a:t>
+            </a:r>
+          </a:p>
+        </p:txBody>
+      </p:sp>
+    </p:spTree>
+    <p:extLst>
+      <p:ext uri="{BB962C8B-B14F-4D97-AF65-F5344CB8AC3E}">
+        <p14:creationId xmlns:p14="http://schemas.microsoft.com/office/powerpoint/2010/main" val="3437439487"/>
+      </p:ext>
+    </p:extLst>
+  </p:cSld>
+  <p:clrMapOvr>
+    <a:masterClrMapping/>
+  </p:clrMapOvr>
+</p:sld>
+</file>
+
 <file path=ppt/slides/slide2.xml><?xml version="1.0" encoding="utf-8"?>
 <p:sld xmlns:a="http://schemas.openxmlformats.org/drawingml/2006/main" xmlns:r="http://schemas.openxmlformats.org/officeDocument/2006/relationships" xmlns:p="http://schemas.openxmlformats.org/presentationml/2006/main">
   <p:cSld>
@@ -19523,361 +20423,1060 @@
       </p:grpSpPr>
       <p:sp>
         <p:nvSpPr>
-          <p:cNvPr id="877" name="Google Shape;877;p13"/>
-          <p:cNvSpPr txBox="1">
-            <a:spLocks noGrp="1"/>
-          </p:cNvSpPr>
-          <p:nvPr>
-            <p:ph type="ctrTitle"/>
-          </p:nvPr>
+          <p:cNvPr id="5" name="TextBox 4">
+            <a:extLst>
+              <a:ext uri="{FF2B5EF4-FFF2-40B4-BE49-F238E27FC236}">
+                <a16:creationId xmlns:a16="http://schemas.microsoft.com/office/drawing/2014/main" id="{36B3D953-0CA6-C883-739F-8C10ADD4C6A9}"/>
+              </a:ext>
+            </a:extLst>
+          </p:cNvPr>
+          <p:cNvSpPr txBox="1"/>
+          <p:nvPr/>
         </p:nvSpPr>
         <p:spPr>
           <a:xfrm>
-            <a:off x="0" y="1886894"/>
-            <a:ext cx="9047408" cy="1159800"/>
+            <a:off x="858965" y="126647"/>
+            <a:ext cx="6061275" cy="1815882"/>
+          </a:xfrm>
+          <a:prstGeom prst="rect">
+            <a:avLst/>
+          </a:prstGeom>
+          <a:noFill/>
+        </p:spPr>
+        <p:txBody>
+          <a:bodyPr wrap="none" rtlCol="0">
+            <a:spAutoFit/>
+          </a:bodyPr>
+          <a:lstStyle/>
+          <a:p>
+            <a:r>
+              <a:rPr lang="es-ES_tradnl" dirty="0"/>
+              <a:t>POO -&gt; Programación Orientada a Objectos</a:t>
+            </a:r>
+          </a:p>
+          <a:p>
+            <a:endParaRPr lang="es-ES_tradnl" dirty="0"/>
+          </a:p>
+          <a:p>
+            <a:r>
+              <a:rPr lang="es-ES_tradnl" dirty="0"/>
+              <a:t>Herencia</a:t>
+            </a:r>
+          </a:p>
+          <a:p>
+            <a:r>
+              <a:rPr lang="es-ES_tradnl" dirty="0"/>
+              <a:t> - Los hijos pueden modificar el comportamiento de los métodos heredado</a:t>
+            </a:r>
+          </a:p>
+          <a:p>
+            <a:pPr marL="285750" indent="-285750">
+              <a:buFontTx/>
+              <a:buChar char="-"/>
+            </a:pPr>
+            <a:r>
+              <a:rPr lang="es-ES_tradnl" dirty="0"/>
+              <a:t>Crear nuevos métodos</a:t>
+            </a:r>
+          </a:p>
+          <a:p>
+            <a:pPr marL="285750" indent="-285750">
+              <a:buFontTx/>
+              <a:buChar char="-"/>
+            </a:pPr>
+            <a:r>
+              <a:rPr lang="es-ES_tradnl" dirty="0"/>
+              <a:t>Modificar los atributos </a:t>
+            </a:r>
+          </a:p>
+          <a:p>
+            <a:pPr marL="285750" indent="-285750">
+              <a:buFontTx/>
+              <a:buChar char="-"/>
+            </a:pPr>
+            <a:r>
+              <a:rPr lang="es-ES_tradnl" dirty="0"/>
+              <a:t>Crear nuevo atributos</a:t>
+            </a:r>
+          </a:p>
+          <a:p>
+            <a:endParaRPr lang="es-ES_tradnl" dirty="0"/>
+          </a:p>
+        </p:txBody>
+      </p:sp>
+      <p:sp>
+        <p:nvSpPr>
+          <p:cNvPr id="4" name="Rectangle 3">
+            <a:extLst>
+              <a:ext uri="{FF2B5EF4-FFF2-40B4-BE49-F238E27FC236}">
+                <a16:creationId xmlns:a16="http://schemas.microsoft.com/office/drawing/2014/main" id="{75B038AD-EC34-B1A0-197C-00BEDFC964E8}"/>
+              </a:ext>
+            </a:extLst>
+          </p:cNvPr>
+          <p:cNvSpPr/>
+          <p:nvPr/>
+        </p:nvSpPr>
+        <p:spPr>
+          <a:xfrm>
+            <a:off x="3620547" y="1804113"/>
+            <a:ext cx="1396336" cy="681510"/>
           </a:xfrm>
           <a:prstGeom prst="rect">
             <a:avLst/>
           </a:prstGeom>
         </p:spPr>
+        <p:style>
+          <a:lnRef idx="2">
+            <a:schemeClr val="accent1">
+              <a:shade val="50000"/>
+            </a:schemeClr>
+          </a:lnRef>
+          <a:fillRef idx="1">
+            <a:schemeClr val="accent1"/>
+          </a:fillRef>
+          <a:effectRef idx="0">
+            <a:schemeClr val="accent1"/>
+          </a:effectRef>
+          <a:fontRef idx="minor">
+            <a:schemeClr val="lt1"/>
+          </a:fontRef>
+        </p:style>
         <p:txBody>
-          <a:bodyPr spcFirstLastPara="1" wrap="square" lIns="0" tIns="0" rIns="0" bIns="0" anchor="ctr" anchorCtr="0">
-            <a:noAutofit/>
-          </a:bodyPr>
+          <a:bodyPr rtlCol="0" anchor="ctr"/>
           <a:lstStyle/>
           <a:p>
-            <a:pPr marL="0" lvl="0" indent="0" algn="ctr" rtl="0">
-              <a:spcBef>
-                <a:spcPts val="0"/>
-              </a:spcBef>
-              <a:spcAft>
-                <a:spcPts val="0"/>
-              </a:spcAft>
-              <a:buNone/>
-            </a:pPr>
+            <a:pPr algn="ctr"/>
             <a:r>
               <a:rPr lang="es-ES_tradnl" dirty="0"/>
-              <a:t>E-Camp</a:t>
-            </a:r>
-            <a:br>
-              <a:rPr lang="es-ES_tradnl" dirty="0"/>
-            </a:br>
-            <a:r>
-              <a:rPr lang="es-ES_tradnl" dirty="0"/>
-              <a:t>Full </a:t>
-            </a:r>
-            <a:r>
-              <a:rPr lang="es-ES_tradnl" dirty="0" err="1"/>
-              <a:t>Stack</a:t>
-            </a:r>
-            <a:r>
-              <a:rPr lang="es-ES_tradnl" dirty="0"/>
-              <a:t> Python</a:t>
-            </a:r>
-            <a:br>
-              <a:rPr lang="es-ES_tradnl" dirty="0"/>
-            </a:br>
-            <a:br>
-              <a:rPr lang="es-ES_tradnl" dirty="0"/>
-            </a:br>
-            <a:r>
-              <a:rPr lang="es-ES_tradnl" dirty="0"/>
-              <a:t>Receso hasta las 21:15</a:t>
+              <a:t>Padre</a:t>
             </a:r>
           </a:p>
         </p:txBody>
       </p:sp>
       <p:sp>
         <p:nvSpPr>
-          <p:cNvPr id="2" name="Google Shape;882;p14">
+          <p:cNvPr id="7" name="Rectangle 6">
             <a:extLst>
               <a:ext uri="{FF2B5EF4-FFF2-40B4-BE49-F238E27FC236}">
-                <a16:creationId xmlns:a16="http://schemas.microsoft.com/office/drawing/2014/main" id="{A63D419E-D1A2-1BC2-F5C8-342811140EB5}"/>
+                <a16:creationId xmlns:a16="http://schemas.microsoft.com/office/drawing/2014/main" id="{E6ADFCCE-4731-5BA4-6836-F98B9C2593F5}"/>
               </a:ext>
             </a:extLst>
           </p:cNvPr>
-          <p:cNvSpPr txBox="1">
-            <a:spLocks/>
-          </p:cNvSpPr>
+          <p:cNvSpPr/>
           <p:nvPr/>
         </p:nvSpPr>
         <p:spPr>
           <a:xfrm>
-            <a:off x="150762" y="4643502"/>
-            <a:ext cx="6240900" cy="396300"/>
+            <a:off x="2067059" y="3387144"/>
+            <a:ext cx="1223493" cy="631064"/>
+          </a:xfrm>
+          <a:prstGeom prst="rect">
+            <a:avLst/>
+          </a:prstGeom>
+        </p:spPr>
+        <p:style>
+          <a:lnRef idx="2">
+            <a:schemeClr val="accent1">
+              <a:shade val="50000"/>
+            </a:schemeClr>
+          </a:lnRef>
+          <a:fillRef idx="1">
+            <a:schemeClr val="accent1"/>
+          </a:fillRef>
+          <a:effectRef idx="0">
+            <a:schemeClr val="accent1"/>
+          </a:effectRef>
+          <a:fontRef idx="minor">
+            <a:schemeClr val="lt1"/>
+          </a:fontRef>
+        </p:style>
+        <p:txBody>
+          <a:bodyPr rtlCol="0" anchor="ctr"/>
+          <a:lstStyle/>
+          <a:p>
+            <a:pPr algn="ctr"/>
+            <a:r>
+              <a:rPr lang="es-ES_tradnl" dirty="0"/>
+              <a:t>Hijo</a:t>
+            </a:r>
+          </a:p>
+        </p:txBody>
+      </p:sp>
+      <p:sp>
+        <p:nvSpPr>
+          <p:cNvPr id="8" name="Rectangle 7">
+            <a:extLst>
+              <a:ext uri="{FF2B5EF4-FFF2-40B4-BE49-F238E27FC236}">
+                <a16:creationId xmlns:a16="http://schemas.microsoft.com/office/drawing/2014/main" id="{9D97B6AB-C134-652F-BF91-ED935D6C75E1}"/>
+              </a:ext>
+            </a:extLst>
+          </p:cNvPr>
+          <p:cNvSpPr/>
+          <p:nvPr/>
+        </p:nvSpPr>
+        <p:spPr>
+          <a:xfrm>
+            <a:off x="3706969" y="3387144"/>
+            <a:ext cx="1223493" cy="631064"/>
+          </a:xfrm>
+          <a:prstGeom prst="rect">
+            <a:avLst/>
+          </a:prstGeom>
+        </p:spPr>
+        <p:style>
+          <a:lnRef idx="2">
+            <a:schemeClr val="accent1">
+              <a:shade val="50000"/>
+            </a:schemeClr>
+          </a:lnRef>
+          <a:fillRef idx="1">
+            <a:schemeClr val="accent1"/>
+          </a:fillRef>
+          <a:effectRef idx="0">
+            <a:schemeClr val="accent1"/>
+          </a:effectRef>
+          <a:fontRef idx="minor">
+            <a:schemeClr val="lt1"/>
+          </a:fontRef>
+        </p:style>
+        <p:txBody>
+          <a:bodyPr rtlCol="0" anchor="ctr"/>
+          <a:lstStyle/>
+          <a:p>
+            <a:pPr algn="ctr"/>
+            <a:r>
+              <a:rPr lang="es-ES_tradnl" dirty="0"/>
+              <a:t>Hijo</a:t>
+            </a:r>
+          </a:p>
+        </p:txBody>
+      </p:sp>
+      <p:sp>
+        <p:nvSpPr>
+          <p:cNvPr id="9" name="Rectangle 8">
+            <a:extLst>
+              <a:ext uri="{FF2B5EF4-FFF2-40B4-BE49-F238E27FC236}">
+                <a16:creationId xmlns:a16="http://schemas.microsoft.com/office/drawing/2014/main" id="{812053E4-6C6C-35BD-09C1-0DE24C7B70E1}"/>
+              </a:ext>
+            </a:extLst>
+          </p:cNvPr>
+          <p:cNvSpPr/>
+          <p:nvPr/>
+        </p:nvSpPr>
+        <p:spPr>
+          <a:xfrm>
+            <a:off x="5346879" y="3387144"/>
+            <a:ext cx="1223493" cy="631064"/>
+          </a:xfrm>
+          <a:prstGeom prst="rect">
+            <a:avLst/>
+          </a:prstGeom>
+        </p:spPr>
+        <p:style>
+          <a:lnRef idx="2">
+            <a:schemeClr val="accent1">
+              <a:shade val="50000"/>
+            </a:schemeClr>
+          </a:lnRef>
+          <a:fillRef idx="1">
+            <a:schemeClr val="accent1"/>
+          </a:fillRef>
+          <a:effectRef idx="0">
+            <a:schemeClr val="accent1"/>
+          </a:effectRef>
+          <a:fontRef idx="minor">
+            <a:schemeClr val="lt1"/>
+          </a:fontRef>
+        </p:style>
+        <p:txBody>
+          <a:bodyPr rtlCol="0" anchor="ctr"/>
+          <a:lstStyle/>
+          <a:p>
+            <a:pPr algn="ctr"/>
+            <a:r>
+              <a:rPr lang="es-ES_tradnl" dirty="0"/>
+              <a:t>Hijo</a:t>
+            </a:r>
+          </a:p>
+        </p:txBody>
+      </p:sp>
+      <p:cxnSp>
+        <p:nvCxnSpPr>
+          <p:cNvPr id="11" name="Straight Arrow Connector 10">
+            <a:extLst>
+              <a:ext uri="{FF2B5EF4-FFF2-40B4-BE49-F238E27FC236}">
+                <a16:creationId xmlns:a16="http://schemas.microsoft.com/office/drawing/2014/main" id="{735AF14B-E256-D53E-A5DD-28959A636C1B}"/>
+              </a:ext>
+            </a:extLst>
+          </p:cNvPr>
+          <p:cNvCxnSpPr/>
+          <p:nvPr/>
+        </p:nvCxnSpPr>
+        <p:spPr>
+          <a:xfrm flipV="1">
+            <a:off x="5016883" y="1680693"/>
+            <a:ext cx="662700" cy="276896"/>
+          </a:xfrm>
+          <a:prstGeom prst="straightConnector1">
+            <a:avLst/>
+          </a:prstGeom>
+          <a:ln>
+            <a:tailEnd type="triangle"/>
+          </a:ln>
+        </p:spPr>
+        <p:style>
+          <a:lnRef idx="1">
+            <a:schemeClr val="accent1"/>
+          </a:lnRef>
+          <a:fillRef idx="0">
+            <a:schemeClr val="accent1"/>
+          </a:fillRef>
+          <a:effectRef idx="0">
+            <a:schemeClr val="accent1"/>
+          </a:effectRef>
+          <a:fontRef idx="minor">
+            <a:schemeClr val="tx1"/>
+          </a:fontRef>
+        </p:style>
+      </p:cxnSp>
+      <p:cxnSp>
+        <p:nvCxnSpPr>
+          <p:cNvPr id="13" name="Straight Arrow Connector 12">
+            <a:extLst>
+              <a:ext uri="{FF2B5EF4-FFF2-40B4-BE49-F238E27FC236}">
+                <a16:creationId xmlns:a16="http://schemas.microsoft.com/office/drawing/2014/main" id="{CC4BBF6E-72C5-3D9C-CC77-6025267921A9}"/>
+              </a:ext>
+            </a:extLst>
+          </p:cNvPr>
+          <p:cNvCxnSpPr/>
+          <p:nvPr/>
+        </p:nvCxnSpPr>
+        <p:spPr>
+          <a:xfrm>
+            <a:off x="5016883" y="2279561"/>
+            <a:ext cx="669140" cy="206062"/>
+          </a:xfrm>
+          <a:prstGeom prst="straightConnector1">
+            <a:avLst/>
+          </a:prstGeom>
+          <a:ln>
+            <a:tailEnd type="triangle"/>
+          </a:ln>
+        </p:spPr>
+        <p:style>
+          <a:lnRef idx="1">
+            <a:schemeClr val="accent1"/>
+          </a:lnRef>
+          <a:fillRef idx="0">
+            <a:schemeClr val="accent1"/>
+          </a:fillRef>
+          <a:effectRef idx="0">
+            <a:schemeClr val="accent1"/>
+          </a:effectRef>
+          <a:fontRef idx="minor">
+            <a:schemeClr val="tx1"/>
+          </a:fontRef>
+        </p:style>
+      </p:cxnSp>
+      <p:sp>
+        <p:nvSpPr>
+          <p:cNvPr id="14" name="TextBox 13">
+            <a:extLst>
+              <a:ext uri="{FF2B5EF4-FFF2-40B4-BE49-F238E27FC236}">
+                <a16:creationId xmlns:a16="http://schemas.microsoft.com/office/drawing/2014/main" id="{6B4A0E89-242F-6306-C948-27ABDD76142E}"/>
+              </a:ext>
+            </a:extLst>
+          </p:cNvPr>
+          <p:cNvSpPr txBox="1"/>
+          <p:nvPr/>
+        </p:nvSpPr>
+        <p:spPr>
+          <a:xfrm>
+            <a:off x="5737538" y="1496336"/>
+            <a:ext cx="891591" cy="307777"/>
           </a:xfrm>
           <a:prstGeom prst="rect">
             <a:avLst/>
           </a:prstGeom>
           <a:noFill/>
+        </p:spPr>
+        <p:txBody>
+          <a:bodyPr wrap="none" rtlCol="0">
+            <a:spAutoFit/>
+          </a:bodyPr>
+          <a:lstStyle/>
+          <a:p>
+            <a:r>
+              <a:rPr lang="es-ES_tradnl" dirty="0"/>
+              <a:t>Atributos</a:t>
+            </a:r>
+          </a:p>
+        </p:txBody>
+      </p:sp>
+      <p:sp>
+        <p:nvSpPr>
+          <p:cNvPr id="16" name="TextBox 15">
+            <a:extLst>
+              <a:ext uri="{FF2B5EF4-FFF2-40B4-BE49-F238E27FC236}">
+                <a16:creationId xmlns:a16="http://schemas.microsoft.com/office/drawing/2014/main" id="{9A40719D-8607-31F2-5486-4DAF4E33FB41}"/>
+              </a:ext>
+            </a:extLst>
+          </p:cNvPr>
+          <p:cNvSpPr txBox="1"/>
+          <p:nvPr/>
+        </p:nvSpPr>
+        <p:spPr>
+          <a:xfrm>
+            <a:off x="5735494" y="2331734"/>
+            <a:ext cx="870751" cy="307777"/>
+          </a:xfrm>
+          <a:prstGeom prst="rect">
+            <a:avLst/>
+          </a:prstGeom>
+          <a:noFill/>
+        </p:spPr>
+        <p:txBody>
+          <a:bodyPr wrap="none" rtlCol="0">
+            <a:spAutoFit/>
+          </a:bodyPr>
+          <a:lstStyle/>
+          <a:p>
+            <a:r>
+              <a:rPr lang="es-ES_tradnl" dirty="0"/>
+              <a:t>Métodos</a:t>
+            </a:r>
+          </a:p>
+        </p:txBody>
+      </p:sp>
+      <p:cxnSp>
+        <p:nvCxnSpPr>
+          <p:cNvPr id="18" name="Straight Arrow Connector 17">
+            <a:extLst>
+              <a:ext uri="{FF2B5EF4-FFF2-40B4-BE49-F238E27FC236}">
+                <a16:creationId xmlns:a16="http://schemas.microsoft.com/office/drawing/2014/main" id="{4E71A921-1220-4A30-44F4-E29F183CD3E3}"/>
+              </a:ext>
+            </a:extLst>
+          </p:cNvPr>
+          <p:cNvCxnSpPr>
+            <a:stCxn id="7" idx="0"/>
+          </p:cNvCxnSpPr>
+          <p:nvPr/>
+        </p:nvCxnSpPr>
+        <p:spPr>
+          <a:xfrm flipV="1">
+            <a:off x="2678806" y="2485623"/>
+            <a:ext cx="1378039" cy="901521"/>
+          </a:xfrm>
+          <a:prstGeom prst="straightConnector1">
+            <a:avLst/>
+          </a:prstGeom>
           <a:ln>
-            <a:noFill/>
+            <a:tailEnd type="triangle"/>
           </a:ln>
         </p:spPr>
+        <p:style>
+          <a:lnRef idx="1">
+            <a:schemeClr val="accent1"/>
+          </a:lnRef>
+          <a:fillRef idx="0">
+            <a:schemeClr val="accent1"/>
+          </a:fillRef>
+          <a:effectRef idx="0">
+            <a:schemeClr val="accent1"/>
+          </a:effectRef>
+          <a:fontRef idx="minor">
+            <a:schemeClr val="tx1"/>
+          </a:fontRef>
+        </p:style>
+      </p:cxnSp>
+      <p:cxnSp>
+        <p:nvCxnSpPr>
+          <p:cNvPr id="20" name="Straight Arrow Connector 19">
+            <a:extLst>
+              <a:ext uri="{FF2B5EF4-FFF2-40B4-BE49-F238E27FC236}">
+                <a16:creationId xmlns:a16="http://schemas.microsoft.com/office/drawing/2014/main" id="{47DC6141-F40B-11A8-4941-D566BDC3860B}"/>
+              </a:ext>
+            </a:extLst>
+          </p:cNvPr>
+          <p:cNvCxnSpPr>
+            <a:endCxn id="4" idx="2"/>
+          </p:cNvCxnSpPr>
+          <p:nvPr/>
+        </p:nvCxnSpPr>
+        <p:spPr>
+          <a:xfrm flipH="1" flipV="1">
+            <a:off x="4318715" y="2485623"/>
+            <a:ext cx="253285" cy="901521"/>
+          </a:xfrm>
+          <a:prstGeom prst="straightConnector1">
+            <a:avLst/>
+          </a:prstGeom>
+          <a:ln>
+            <a:tailEnd type="triangle"/>
+          </a:ln>
+        </p:spPr>
+        <p:style>
+          <a:lnRef idx="1">
+            <a:schemeClr val="accent1"/>
+          </a:lnRef>
+          <a:fillRef idx="0">
+            <a:schemeClr val="accent1"/>
+          </a:fillRef>
+          <a:effectRef idx="0">
+            <a:schemeClr val="accent1"/>
+          </a:effectRef>
+          <a:fontRef idx="minor">
+            <a:schemeClr val="tx1"/>
+          </a:fontRef>
+        </p:style>
+      </p:cxnSp>
+      <p:cxnSp>
+        <p:nvCxnSpPr>
+          <p:cNvPr id="22" name="Straight Arrow Connector 21">
+            <a:extLst>
+              <a:ext uri="{FF2B5EF4-FFF2-40B4-BE49-F238E27FC236}">
+                <a16:creationId xmlns:a16="http://schemas.microsoft.com/office/drawing/2014/main" id="{26C4808F-149E-D453-F72E-1F0C590A13D9}"/>
+              </a:ext>
+            </a:extLst>
+          </p:cNvPr>
+          <p:cNvCxnSpPr>
+            <a:stCxn id="9" idx="0"/>
+          </p:cNvCxnSpPr>
+          <p:nvPr/>
+        </p:nvCxnSpPr>
+        <p:spPr>
+          <a:xfrm flipH="1" flipV="1">
+            <a:off x="4682032" y="2485622"/>
+            <a:ext cx="1276594" cy="901522"/>
+          </a:xfrm>
+          <a:prstGeom prst="straightConnector1">
+            <a:avLst/>
+          </a:prstGeom>
+          <a:ln>
+            <a:tailEnd type="triangle"/>
+          </a:ln>
+        </p:spPr>
+        <p:style>
+          <a:lnRef idx="1">
+            <a:schemeClr val="accent1"/>
+          </a:lnRef>
+          <a:fillRef idx="0">
+            <a:schemeClr val="accent1"/>
+          </a:fillRef>
+          <a:effectRef idx="0">
+            <a:schemeClr val="accent1"/>
+          </a:effectRef>
+          <a:fontRef idx="minor">
+            <a:schemeClr val="tx1"/>
+          </a:fontRef>
+        </p:style>
+      </p:cxnSp>
+      <p:sp>
+        <p:nvSpPr>
+          <p:cNvPr id="23" name="Rectangle 22">
+            <a:extLst>
+              <a:ext uri="{FF2B5EF4-FFF2-40B4-BE49-F238E27FC236}">
+                <a16:creationId xmlns:a16="http://schemas.microsoft.com/office/drawing/2014/main" id="{D5C50988-26C6-471B-A909-0555A546A403}"/>
+              </a:ext>
+            </a:extLst>
+          </p:cNvPr>
+          <p:cNvSpPr/>
+          <p:nvPr/>
+        </p:nvSpPr>
+        <p:spPr>
+          <a:xfrm>
+            <a:off x="585989" y="4436772"/>
+            <a:ext cx="1178417" cy="482958"/>
+          </a:xfrm>
+          <a:prstGeom prst="rect">
+            <a:avLst/>
+          </a:prstGeom>
+        </p:spPr>
+        <p:style>
+          <a:lnRef idx="2">
+            <a:schemeClr val="accent1">
+              <a:shade val="50000"/>
+            </a:schemeClr>
+          </a:lnRef>
+          <a:fillRef idx="1">
+            <a:schemeClr val="accent1"/>
+          </a:fillRef>
+          <a:effectRef idx="0">
+            <a:schemeClr val="accent1"/>
+          </a:effectRef>
+          <a:fontRef idx="minor">
+            <a:schemeClr val="lt1"/>
+          </a:fontRef>
+        </p:style>
         <p:txBody>
-          <a:bodyPr spcFirstLastPara="1" wrap="square" lIns="0" tIns="0" rIns="0" bIns="0" anchor="b" anchorCtr="0">
-            <a:noAutofit/>
+          <a:bodyPr rtlCol="0" anchor="ctr"/>
+          <a:lstStyle/>
+          <a:p>
+            <a:pPr algn="ctr"/>
+            <a:r>
+              <a:rPr lang="es-ES_tradnl" dirty="0"/>
+              <a:t>Nieto</a:t>
+            </a:r>
+          </a:p>
+        </p:txBody>
+      </p:sp>
+      <p:sp>
+        <p:nvSpPr>
+          <p:cNvPr id="24" name="Rectangle 23">
+            <a:extLst>
+              <a:ext uri="{FF2B5EF4-FFF2-40B4-BE49-F238E27FC236}">
+                <a16:creationId xmlns:a16="http://schemas.microsoft.com/office/drawing/2014/main" id="{E68ADA7C-0A09-27B9-F9E8-3839B9166D80}"/>
+              </a:ext>
+            </a:extLst>
+          </p:cNvPr>
+          <p:cNvSpPr/>
+          <p:nvPr/>
+        </p:nvSpPr>
+        <p:spPr>
+          <a:xfrm>
+            <a:off x="2189408" y="4436771"/>
+            <a:ext cx="1178417" cy="482958"/>
+          </a:xfrm>
+          <a:prstGeom prst="rect">
+            <a:avLst/>
+          </a:prstGeom>
+        </p:spPr>
+        <p:style>
+          <a:lnRef idx="2">
+            <a:schemeClr val="accent1">
+              <a:shade val="50000"/>
+            </a:schemeClr>
+          </a:lnRef>
+          <a:fillRef idx="1">
+            <a:schemeClr val="accent1"/>
+          </a:fillRef>
+          <a:effectRef idx="0">
+            <a:schemeClr val="accent1"/>
+          </a:effectRef>
+          <a:fontRef idx="minor">
+            <a:schemeClr val="lt1"/>
+          </a:fontRef>
+        </p:style>
+        <p:txBody>
+          <a:bodyPr rtlCol="0" anchor="ctr"/>
+          <a:lstStyle/>
+          <a:p>
+            <a:pPr algn="ctr"/>
+            <a:r>
+              <a:rPr lang="es-ES_tradnl" dirty="0"/>
+              <a:t>Nieto</a:t>
+            </a:r>
+          </a:p>
+        </p:txBody>
+      </p:sp>
+      <p:cxnSp>
+        <p:nvCxnSpPr>
+          <p:cNvPr id="26" name="Straight Arrow Connector 25">
+            <a:extLst>
+              <a:ext uri="{FF2B5EF4-FFF2-40B4-BE49-F238E27FC236}">
+                <a16:creationId xmlns:a16="http://schemas.microsoft.com/office/drawing/2014/main" id="{EC97CDF3-110C-E004-495B-7927B47545EB}"/>
+              </a:ext>
+            </a:extLst>
+          </p:cNvPr>
+          <p:cNvCxnSpPr>
+            <a:stCxn id="23" idx="0"/>
+          </p:cNvCxnSpPr>
+          <p:nvPr/>
+        </p:nvCxnSpPr>
+        <p:spPr>
+          <a:xfrm flipV="1">
+            <a:off x="1175198" y="4018208"/>
+            <a:ext cx="1175196" cy="418564"/>
+          </a:xfrm>
+          <a:prstGeom prst="straightConnector1">
+            <a:avLst/>
+          </a:prstGeom>
+          <a:ln>
+            <a:tailEnd type="triangle"/>
+          </a:ln>
+        </p:spPr>
+        <p:style>
+          <a:lnRef idx="1">
+            <a:schemeClr val="accent1"/>
+          </a:lnRef>
+          <a:fillRef idx="0">
+            <a:schemeClr val="accent1"/>
+          </a:fillRef>
+          <a:effectRef idx="0">
+            <a:schemeClr val="accent1"/>
+          </a:effectRef>
+          <a:fontRef idx="minor">
+            <a:schemeClr val="tx1"/>
+          </a:fontRef>
+        </p:style>
+      </p:cxnSp>
+      <p:cxnSp>
+        <p:nvCxnSpPr>
+          <p:cNvPr id="28" name="Straight Arrow Connector 27">
+            <a:extLst>
+              <a:ext uri="{FF2B5EF4-FFF2-40B4-BE49-F238E27FC236}">
+                <a16:creationId xmlns:a16="http://schemas.microsoft.com/office/drawing/2014/main" id="{F782A388-32CC-A2B9-C862-DC47B9753EFE}"/>
+              </a:ext>
+            </a:extLst>
+          </p:cNvPr>
+          <p:cNvCxnSpPr>
+            <a:endCxn id="7" idx="2"/>
+          </p:cNvCxnSpPr>
+          <p:nvPr/>
+        </p:nvCxnSpPr>
+        <p:spPr>
+          <a:xfrm flipH="1" flipV="1">
+            <a:off x="2678806" y="4018208"/>
+            <a:ext cx="309630" cy="418563"/>
+          </a:xfrm>
+          <a:prstGeom prst="straightConnector1">
+            <a:avLst/>
+          </a:prstGeom>
+          <a:ln>
+            <a:tailEnd type="triangle"/>
+          </a:ln>
+        </p:spPr>
+        <p:style>
+          <a:lnRef idx="1">
+            <a:schemeClr val="accent1"/>
+          </a:lnRef>
+          <a:fillRef idx="0">
+            <a:schemeClr val="accent1"/>
+          </a:fillRef>
+          <a:effectRef idx="0">
+            <a:schemeClr val="accent1"/>
+          </a:effectRef>
+          <a:fontRef idx="minor">
+            <a:schemeClr val="tx1"/>
+          </a:fontRef>
+        </p:style>
+      </p:cxnSp>
+    </p:spTree>
+    <p:extLst>
+      <p:ext uri="{BB962C8B-B14F-4D97-AF65-F5344CB8AC3E}">
+        <p14:creationId xmlns:p14="http://schemas.microsoft.com/office/powerpoint/2010/main" val="1581410040"/>
+      </p:ext>
+    </p:extLst>
+  </p:cSld>
+  <p:clrMapOvr>
+    <a:masterClrMapping/>
+  </p:clrMapOvr>
+</p:sld>
+</file>
+
+<file path=ppt/slides/slide8.xml><?xml version="1.0" encoding="utf-8"?>
+<p:sld xmlns:a="http://schemas.openxmlformats.org/drawingml/2006/main" xmlns:r="http://schemas.openxmlformats.org/officeDocument/2006/relationships" xmlns:p="http://schemas.openxmlformats.org/presentationml/2006/main">
+  <p:cSld>
+    <p:spTree>
+      <p:nvGrpSpPr>
+        <p:cNvPr id="1" name="Shape 876"/>
+        <p:cNvGrpSpPr/>
+        <p:nvPr/>
+      </p:nvGrpSpPr>
+      <p:grpSpPr>
+        <a:xfrm>
+          <a:off x="0" y="0"/>
+          <a:ext cx="0" cy="0"/>
+          <a:chOff x="0" y="0"/>
+          <a:chExt cx="0" cy="0"/>
+        </a:xfrm>
+      </p:grpSpPr>
+      <p:sp>
+        <p:nvSpPr>
+          <p:cNvPr id="5" name="TextBox 4">
+            <a:extLst>
+              <a:ext uri="{FF2B5EF4-FFF2-40B4-BE49-F238E27FC236}">
+                <a16:creationId xmlns:a16="http://schemas.microsoft.com/office/drawing/2014/main" id="{080D988C-B143-C587-8924-933919A4AC3B}"/>
+              </a:ext>
+            </a:extLst>
+          </p:cNvPr>
+          <p:cNvSpPr txBox="1"/>
+          <p:nvPr/>
+        </p:nvSpPr>
+        <p:spPr>
+          <a:xfrm>
+            <a:off x="1204175" y="592428"/>
+            <a:ext cx="6458819" cy="307777"/>
+          </a:xfrm>
+          <a:prstGeom prst="rect">
+            <a:avLst/>
+          </a:prstGeom>
+          <a:noFill/>
+        </p:spPr>
+        <p:txBody>
+          <a:bodyPr wrap="none" rtlCol="0">
+            <a:spAutoFit/>
           </a:bodyPr>
-          <a:lstStyle>
-            <a:defPPr marR="0" lvl="0" algn="l" rtl="0">
-              <a:lnSpc>
-                <a:spcPct val="100000"/>
-              </a:lnSpc>
-              <a:spcBef>
-                <a:spcPts val="0"/>
-              </a:spcBef>
-              <a:spcAft>
-                <a:spcPts val="0"/>
-              </a:spcAft>
-            </a:defPPr>
-            <a:lvl1pPr marR="0" lvl="0" algn="ctr" rtl="0">
-              <a:lnSpc>
-                <a:spcPct val="90000"/>
-              </a:lnSpc>
-              <a:spcBef>
-                <a:spcPts val="0"/>
-              </a:spcBef>
-              <a:spcAft>
-                <a:spcPts val="0"/>
-              </a:spcAft>
-              <a:buClr>
-                <a:schemeClr val="dk1"/>
-              </a:buClr>
-              <a:buSzPts val="5800"/>
-              <a:buFont typeface="Space Grotesk Light"/>
-              <a:buNone/>
-              <a:defRPr sz="5800" b="0" i="0" u="none" strike="noStrike" cap="none">
-                <a:solidFill>
-                  <a:schemeClr val="dk1"/>
-                </a:solidFill>
-                <a:latin typeface="Space Grotesk Light"/>
-                <a:ea typeface="Space Grotesk Light"/>
-                <a:cs typeface="Space Grotesk Light"/>
-                <a:sym typeface="Space Grotesk Light"/>
-              </a:defRPr>
-            </a:lvl1pPr>
-            <a:lvl2pPr marR="0" lvl="1" algn="ctr" rtl="0">
-              <a:lnSpc>
-                <a:spcPct val="90000"/>
-              </a:lnSpc>
-              <a:spcBef>
-                <a:spcPts val="0"/>
-              </a:spcBef>
-              <a:spcAft>
-                <a:spcPts val="0"/>
-              </a:spcAft>
-              <a:buClr>
-                <a:schemeClr val="dk1"/>
-              </a:buClr>
-              <a:buSzPts val="5800"/>
-              <a:buFont typeface="Space Grotesk Light"/>
-              <a:buNone/>
-              <a:defRPr sz="5800" b="0" i="0" u="none" strike="noStrike" cap="none">
-                <a:solidFill>
-                  <a:schemeClr val="dk1"/>
-                </a:solidFill>
-                <a:latin typeface="Space Grotesk Light"/>
-                <a:ea typeface="Space Grotesk Light"/>
-                <a:cs typeface="Space Grotesk Light"/>
-                <a:sym typeface="Space Grotesk Light"/>
-              </a:defRPr>
-            </a:lvl2pPr>
-            <a:lvl3pPr marR="0" lvl="2" algn="ctr" rtl="0">
-              <a:lnSpc>
-                <a:spcPct val="90000"/>
-              </a:lnSpc>
-              <a:spcBef>
-                <a:spcPts val="0"/>
-              </a:spcBef>
-              <a:spcAft>
-                <a:spcPts val="0"/>
-              </a:spcAft>
-              <a:buClr>
-                <a:schemeClr val="dk1"/>
-              </a:buClr>
-              <a:buSzPts val="5800"/>
-              <a:buFont typeface="Space Grotesk Light"/>
-              <a:buNone/>
-              <a:defRPr sz="5800" b="0" i="0" u="none" strike="noStrike" cap="none">
-                <a:solidFill>
-                  <a:schemeClr val="dk1"/>
-                </a:solidFill>
-                <a:latin typeface="Space Grotesk Light"/>
-                <a:ea typeface="Space Grotesk Light"/>
-                <a:cs typeface="Space Grotesk Light"/>
-                <a:sym typeface="Space Grotesk Light"/>
-              </a:defRPr>
-            </a:lvl3pPr>
-            <a:lvl4pPr marR="0" lvl="3" algn="ctr" rtl="0">
-              <a:lnSpc>
-                <a:spcPct val="90000"/>
-              </a:lnSpc>
-              <a:spcBef>
-                <a:spcPts val="0"/>
-              </a:spcBef>
-              <a:spcAft>
-                <a:spcPts val="0"/>
-              </a:spcAft>
-              <a:buClr>
-                <a:schemeClr val="dk1"/>
-              </a:buClr>
-              <a:buSzPts val="5800"/>
-              <a:buFont typeface="Space Grotesk Light"/>
-              <a:buNone/>
-              <a:defRPr sz="5800" b="0" i="0" u="none" strike="noStrike" cap="none">
-                <a:solidFill>
-                  <a:schemeClr val="dk1"/>
-                </a:solidFill>
-                <a:latin typeface="Space Grotesk Light"/>
-                <a:ea typeface="Space Grotesk Light"/>
-                <a:cs typeface="Space Grotesk Light"/>
-                <a:sym typeface="Space Grotesk Light"/>
-              </a:defRPr>
-            </a:lvl4pPr>
-            <a:lvl5pPr marR="0" lvl="4" algn="ctr" rtl="0">
-              <a:lnSpc>
-                <a:spcPct val="90000"/>
-              </a:lnSpc>
-              <a:spcBef>
-                <a:spcPts val="0"/>
-              </a:spcBef>
-              <a:spcAft>
-                <a:spcPts val="0"/>
-              </a:spcAft>
-              <a:buClr>
-                <a:schemeClr val="dk1"/>
-              </a:buClr>
-              <a:buSzPts val="5800"/>
-              <a:buFont typeface="Space Grotesk Light"/>
-              <a:buNone/>
-              <a:defRPr sz="5800" b="0" i="0" u="none" strike="noStrike" cap="none">
-                <a:solidFill>
-                  <a:schemeClr val="dk1"/>
-                </a:solidFill>
-                <a:latin typeface="Space Grotesk Light"/>
-                <a:ea typeface="Space Grotesk Light"/>
-                <a:cs typeface="Space Grotesk Light"/>
-                <a:sym typeface="Space Grotesk Light"/>
-              </a:defRPr>
-            </a:lvl5pPr>
-            <a:lvl6pPr marR="0" lvl="5" algn="ctr" rtl="0">
-              <a:lnSpc>
-                <a:spcPct val="90000"/>
-              </a:lnSpc>
-              <a:spcBef>
-                <a:spcPts val="0"/>
-              </a:spcBef>
-              <a:spcAft>
-                <a:spcPts val="0"/>
-              </a:spcAft>
-              <a:buClr>
-                <a:schemeClr val="dk1"/>
-              </a:buClr>
-              <a:buSzPts val="5800"/>
-              <a:buFont typeface="Space Grotesk Light"/>
-              <a:buNone/>
-              <a:defRPr sz="5800" b="0" i="0" u="none" strike="noStrike" cap="none">
-                <a:solidFill>
-                  <a:schemeClr val="dk1"/>
-                </a:solidFill>
-                <a:latin typeface="Space Grotesk Light"/>
-                <a:ea typeface="Space Grotesk Light"/>
-                <a:cs typeface="Space Grotesk Light"/>
-                <a:sym typeface="Space Grotesk Light"/>
-              </a:defRPr>
-            </a:lvl6pPr>
-            <a:lvl7pPr marR="0" lvl="6" algn="ctr" rtl="0">
-              <a:lnSpc>
-                <a:spcPct val="90000"/>
-              </a:lnSpc>
-              <a:spcBef>
-                <a:spcPts val="0"/>
-              </a:spcBef>
-              <a:spcAft>
-                <a:spcPts val="0"/>
-              </a:spcAft>
-              <a:buClr>
-                <a:schemeClr val="dk1"/>
-              </a:buClr>
-              <a:buSzPts val="5800"/>
-              <a:buFont typeface="Space Grotesk Light"/>
-              <a:buNone/>
-              <a:defRPr sz="5800" b="0" i="0" u="none" strike="noStrike" cap="none">
-                <a:solidFill>
-                  <a:schemeClr val="dk1"/>
-                </a:solidFill>
-                <a:latin typeface="Space Grotesk Light"/>
-                <a:ea typeface="Space Grotesk Light"/>
-                <a:cs typeface="Space Grotesk Light"/>
-                <a:sym typeface="Space Grotesk Light"/>
-              </a:defRPr>
-            </a:lvl7pPr>
-            <a:lvl8pPr marR="0" lvl="7" algn="ctr" rtl="0">
-              <a:lnSpc>
-                <a:spcPct val="90000"/>
-              </a:lnSpc>
-              <a:spcBef>
-                <a:spcPts val="0"/>
-              </a:spcBef>
-              <a:spcAft>
-                <a:spcPts val="0"/>
-              </a:spcAft>
-              <a:buClr>
-                <a:schemeClr val="dk1"/>
-              </a:buClr>
-              <a:buSzPts val="5800"/>
-              <a:buFont typeface="Space Grotesk Light"/>
-              <a:buNone/>
-              <a:defRPr sz="5800" b="0" i="0" u="none" strike="noStrike" cap="none">
-                <a:solidFill>
-                  <a:schemeClr val="dk1"/>
-                </a:solidFill>
-                <a:latin typeface="Space Grotesk Light"/>
-                <a:ea typeface="Space Grotesk Light"/>
-                <a:cs typeface="Space Grotesk Light"/>
-                <a:sym typeface="Space Grotesk Light"/>
-              </a:defRPr>
-            </a:lvl8pPr>
-            <a:lvl9pPr marR="0" lvl="8" algn="ctr" rtl="0">
-              <a:lnSpc>
-                <a:spcPct val="90000"/>
-              </a:lnSpc>
-              <a:spcBef>
-                <a:spcPts val="0"/>
-              </a:spcBef>
-              <a:spcAft>
-                <a:spcPts val="0"/>
-              </a:spcAft>
-              <a:buClr>
-                <a:schemeClr val="dk1"/>
-              </a:buClr>
-              <a:buSzPts val="5800"/>
-              <a:buFont typeface="Space Grotesk Light"/>
-              <a:buNone/>
-              <a:defRPr sz="5800" b="0" i="0" u="none" strike="noStrike" cap="none">
-                <a:solidFill>
-                  <a:schemeClr val="dk1"/>
-                </a:solidFill>
-                <a:latin typeface="Space Grotesk Light"/>
-                <a:ea typeface="Space Grotesk Light"/>
-                <a:cs typeface="Space Grotesk Light"/>
-                <a:sym typeface="Space Grotesk Light"/>
-              </a:defRPr>
-            </a:lvl9pPr>
-          </a:lstStyle>
+          <a:lstStyle/>
           <a:p>
-            <a:pPr algn="l"/>
             <a:r>
-              <a:rPr lang="es-ES_tradnl" sz="2800"/>
-              <a:t>Richar Lujano</a:t>
+              <a:rPr lang="es-ES_tradnl" dirty="0"/>
+              <a:t>Herencia </a:t>
             </a:r>
+            <a:r>
+              <a:rPr lang="es-ES_tradnl" dirty="0" err="1"/>
+              <a:t>Multiple</a:t>
+            </a:r>
+            <a:r>
+              <a:rPr lang="es-ES_tradnl" dirty="0"/>
+              <a:t> </a:t>
+            </a:r>
+            <a:r>
+              <a:rPr lang="es-ES_tradnl" dirty="0">
+                <a:sym typeface="Wingdings" pitchFamily="2" charset="2"/>
+              </a:rPr>
+              <a:t> la capacidad de una clase de heredar de dos o mas clases</a:t>
+            </a:r>
+            <a:endParaRPr lang="es-ES_tradnl" dirty="0"/>
+          </a:p>
+        </p:txBody>
+      </p:sp>
+      <p:pic>
+        <p:nvPicPr>
+          <p:cNvPr id="6" name="Picture 5">
+            <a:extLst>
+              <a:ext uri="{FF2B5EF4-FFF2-40B4-BE49-F238E27FC236}">
+                <a16:creationId xmlns:a16="http://schemas.microsoft.com/office/drawing/2014/main" id="{488EF1A5-4266-450B-5B59-ADB8CBB23E22}"/>
+              </a:ext>
+            </a:extLst>
+          </p:cNvPr>
+          <p:cNvPicPr>
+            <a:picLocks noChangeAspect="1"/>
+          </p:cNvPicPr>
+          <p:nvPr/>
+        </p:nvPicPr>
+        <p:blipFill>
+          <a:blip r:embed="rId3"/>
+          <a:stretch>
+            <a:fillRect/>
+          </a:stretch>
+        </p:blipFill>
+        <p:spPr>
+          <a:xfrm>
+            <a:off x="808060" y="1199167"/>
+            <a:ext cx="7759700" cy="1689100"/>
+          </a:xfrm>
+          <a:prstGeom prst="rect">
+            <a:avLst/>
+          </a:prstGeom>
+        </p:spPr>
+      </p:pic>
+      <p:pic>
+        <p:nvPicPr>
+          <p:cNvPr id="7" name="Picture 6">
+            <a:extLst>
+              <a:ext uri="{FF2B5EF4-FFF2-40B4-BE49-F238E27FC236}">
+                <a16:creationId xmlns:a16="http://schemas.microsoft.com/office/drawing/2014/main" id="{67D52DA5-0742-8738-6481-5F22D97EB7B5}"/>
+              </a:ext>
+            </a:extLst>
+          </p:cNvPr>
+          <p:cNvPicPr>
+            <a:picLocks noChangeAspect="1"/>
+          </p:cNvPicPr>
+          <p:nvPr/>
+        </p:nvPicPr>
+        <p:blipFill>
+          <a:blip r:embed="rId4"/>
+          <a:stretch>
+            <a:fillRect/>
+          </a:stretch>
+        </p:blipFill>
+        <p:spPr>
+          <a:xfrm>
+            <a:off x="122537" y="3403161"/>
+            <a:ext cx="8898926" cy="1207475"/>
+          </a:xfrm>
+          <a:prstGeom prst="rect">
+            <a:avLst/>
+          </a:prstGeom>
+        </p:spPr>
+      </p:pic>
+    </p:spTree>
+    <p:extLst>
+      <p:ext uri="{BB962C8B-B14F-4D97-AF65-F5344CB8AC3E}">
+        <p14:creationId xmlns:p14="http://schemas.microsoft.com/office/powerpoint/2010/main" val="441970846"/>
+      </p:ext>
+    </p:extLst>
+  </p:cSld>
+  <p:clrMapOvr>
+    <a:masterClrMapping/>
+  </p:clrMapOvr>
+</p:sld>
+</file>
+
+<file path=ppt/slides/slide9.xml><?xml version="1.0" encoding="utf-8"?>
+<p:sld xmlns:a="http://schemas.openxmlformats.org/drawingml/2006/main" xmlns:r="http://schemas.openxmlformats.org/officeDocument/2006/relationships" xmlns:p="http://schemas.openxmlformats.org/presentationml/2006/main">
+  <p:cSld>
+    <p:spTree>
+      <p:nvGrpSpPr>
+        <p:cNvPr id="1" name="Shape 876"/>
+        <p:cNvGrpSpPr/>
+        <p:nvPr/>
+      </p:nvGrpSpPr>
+      <p:grpSpPr>
+        <a:xfrm>
+          <a:off x="0" y="0"/>
+          <a:ext cx="0" cy="0"/>
+          <a:chOff x="0" y="0"/>
+          <a:chExt cx="0" cy="0"/>
+        </a:xfrm>
+      </p:grpSpPr>
+      <p:sp>
+        <p:nvSpPr>
+          <p:cNvPr id="5" name="TextBox 4">
+            <a:extLst>
+              <a:ext uri="{FF2B5EF4-FFF2-40B4-BE49-F238E27FC236}">
+                <a16:creationId xmlns:a16="http://schemas.microsoft.com/office/drawing/2014/main" id="{36B3D953-0CA6-C883-739F-8C10ADD4C6A9}"/>
+              </a:ext>
+            </a:extLst>
+          </p:cNvPr>
+          <p:cNvSpPr txBox="1"/>
+          <p:nvPr/>
+        </p:nvSpPr>
+        <p:spPr>
+          <a:xfrm>
+            <a:off x="858965" y="126647"/>
+            <a:ext cx="4249881" cy="2893100"/>
+          </a:xfrm>
+          <a:prstGeom prst="rect">
+            <a:avLst/>
+          </a:prstGeom>
+          <a:noFill/>
+        </p:spPr>
+        <p:txBody>
+          <a:bodyPr wrap="none" rtlCol="0">
+            <a:spAutoFit/>
+          </a:bodyPr>
+          <a:lstStyle/>
+          <a:p>
+            <a:r>
+              <a:rPr lang="es-ES_tradnl" dirty="0"/>
+              <a:t>POO -&gt; Programación Orientada a Objectos</a:t>
+            </a:r>
+          </a:p>
+          <a:p>
+            <a:endParaRPr lang="es-ES_tradnl" dirty="0"/>
+          </a:p>
+          <a:p>
+            <a:r>
+              <a:rPr lang="es-ES_tradnl" dirty="0"/>
+              <a:t>Sobre carga de métodos</a:t>
+            </a:r>
+          </a:p>
+          <a:p>
+            <a:endParaRPr lang="es-ES_tradnl" dirty="0"/>
+          </a:p>
+          <a:p>
+            <a:r>
+              <a:rPr lang="es-ES_tradnl" dirty="0" err="1"/>
+              <a:t>def</a:t>
+            </a:r>
+            <a:r>
+              <a:rPr lang="es-ES_tradnl" dirty="0"/>
+              <a:t> llamar(</a:t>
+            </a:r>
+            <a:r>
+              <a:rPr lang="es-ES_tradnl" dirty="0" err="1"/>
+              <a:t>self</a:t>
+            </a:r>
+            <a:r>
+              <a:rPr lang="es-ES_tradnl" dirty="0"/>
+              <a:t>):</a:t>
+            </a:r>
+          </a:p>
+          <a:p>
+            <a:r>
+              <a:rPr lang="es-ES_tradnl" dirty="0"/>
+              <a:t>    </a:t>
+            </a:r>
+            <a:r>
+              <a:rPr lang="es-ES_tradnl" dirty="0" err="1"/>
+              <a:t>print</a:t>
+            </a:r>
+            <a:r>
+              <a:rPr lang="es-ES_tradnl" dirty="0"/>
+              <a:t>(“estoy llamando)</a:t>
+            </a:r>
+          </a:p>
+          <a:p>
+            <a:endParaRPr lang="es-ES_tradnl" dirty="0"/>
+          </a:p>
+          <a:p>
+            <a:r>
+              <a:rPr lang="es-ES_tradnl" dirty="0" err="1"/>
+              <a:t>def</a:t>
+            </a:r>
+            <a:r>
+              <a:rPr lang="es-ES_tradnl" dirty="0"/>
+              <a:t> llamar(</a:t>
+            </a:r>
+            <a:r>
+              <a:rPr lang="es-ES_tradnl" dirty="0" err="1"/>
+              <a:t>self</a:t>
+            </a:r>
+            <a:r>
+              <a:rPr lang="es-ES_tradnl" dirty="0"/>
+              <a:t>, _medio):</a:t>
+            </a:r>
+          </a:p>
+          <a:p>
+            <a:r>
+              <a:rPr lang="es-ES_tradnl" dirty="0"/>
+              <a:t>   </a:t>
+            </a:r>
+            <a:r>
+              <a:rPr lang="es-ES_tradnl" dirty="0" err="1"/>
+              <a:t>print</a:t>
+            </a:r>
+            <a:r>
+              <a:rPr lang="es-ES_tradnl" dirty="0"/>
+              <a:t>(“estoy llamando con {_medio}”)</a:t>
+            </a:r>
+          </a:p>
+          <a:p>
+            <a:endParaRPr lang="es-ES_tradnl" dirty="0"/>
+          </a:p>
+          <a:p>
+            <a:r>
+              <a:rPr lang="es-ES_tradnl" dirty="0" err="1"/>
+              <a:t>def</a:t>
+            </a:r>
+            <a:r>
+              <a:rPr lang="es-ES_tradnl" dirty="0"/>
+              <a:t> llamar(</a:t>
+            </a:r>
+            <a:r>
+              <a:rPr lang="es-ES_tradnl" dirty="0" err="1"/>
+              <a:t>self</a:t>
+            </a:r>
+            <a:r>
+              <a:rPr lang="es-ES_tradnl" dirty="0"/>
+              <a:t>, _medio, _time):</a:t>
+            </a:r>
+          </a:p>
+          <a:p>
+            <a:r>
+              <a:rPr lang="es-ES_tradnl" dirty="0"/>
+              <a:t>   </a:t>
+            </a:r>
+            <a:r>
+              <a:rPr lang="es-ES_tradnl" dirty="0" err="1"/>
+              <a:t>print</a:t>
+            </a:r>
+            <a:r>
+              <a:rPr lang="es-ES_tradnl" dirty="0"/>
+              <a:t>(“estoy llamando con {_medio} a las {_time}”)</a:t>
+            </a:r>
+          </a:p>
+          <a:p>
+            <a:endParaRPr lang="es-ES_tradnl" dirty="0"/>
           </a:p>
         </p:txBody>
       </p:sp>
     </p:spTree>
     <p:extLst>
       <p:ext uri="{BB962C8B-B14F-4D97-AF65-F5344CB8AC3E}">
-        <p14:creationId xmlns:p14="http://schemas.microsoft.com/office/powerpoint/2010/main" val="441970846"/>
+        <p14:creationId xmlns:p14="http://schemas.microsoft.com/office/powerpoint/2010/main" val="3624517506"/>
       </p:ext>
     </p:extLst>
   </p:cSld>

</xml_diff>